<commit_message>
Fixed last minute issues we found
</commit_message>
<xml_diff>
--- a/Content/BigData/HDInsight and Big Data.pptx
+++ b/Content/BigData/HDInsight and Big Data.pptx
@@ -5,7 +5,7 @@
     <p:sldMasterId id="2147483680" r:id="rId1"/>
   </p:sldMasterIdLst>
   <p:notesMasterIdLst>
-    <p:notesMasterId r:id="rId12"/>
+    <p:notesMasterId r:id="rId13"/>
   </p:notesMasterIdLst>
   <p:sldIdLst>
     <p:sldId id="256" r:id="rId2"/>
@@ -17,7 +17,8 @@
     <p:sldId id="264" r:id="rId8"/>
     <p:sldId id="263" r:id="rId9"/>
     <p:sldId id="266" r:id="rId10"/>
-    <p:sldId id="265" r:id="rId11"/>
+    <p:sldId id="267" r:id="rId11"/>
+    <p:sldId id="265" r:id="rId12"/>
   </p:sldIdLst>
   <p:sldSz cx="12192000" cy="6858000"/>
   <p:notesSz cx="6858000" cy="9144000"/>
@@ -206,7 +207,7 @@
           <a:p>
             <a:fld id="{2E5CA586-3557-4985-BCD4-35EF5AC8B4A4}" type="datetimeFigureOut">
               <a:rPr lang="en-US" smtClean="0"/>
-              <a:t>9/14/15</a:t>
+              <a:t>9/14/2015</a:t>
             </a:fld>
             <a:endParaRPr lang="en-US"/>
           </a:p>
@@ -11359,6 +11360,113 @@
 </file>
 
 <file path=ppt/slides/slide10.xml><?xml version="1.0" encoding="utf-8"?>
+<p:sld xmlns:a="http://schemas.openxmlformats.org/drawingml/2006/main" xmlns:r="http://schemas.openxmlformats.org/officeDocument/2006/relationships" xmlns:p="http://schemas.openxmlformats.org/presentationml/2006/main">
+  <p:cSld>
+    <p:spTree>
+      <p:nvGrpSpPr>
+        <p:cNvPr id="1" name=""/>
+        <p:cNvGrpSpPr/>
+        <p:nvPr/>
+      </p:nvGrpSpPr>
+      <p:grpSpPr>
+        <a:xfrm>
+          <a:off x="0" y="0"/>
+          <a:ext cx="0" cy="0"/>
+          <a:chOff x="0" y="0"/>
+          <a:chExt cx="0" cy="0"/>
+        </a:xfrm>
+      </p:grpSpPr>
+      <p:sp>
+        <p:nvSpPr>
+          <p:cNvPr id="2" name="Title 1"/>
+          <p:cNvSpPr>
+            <a:spLocks noGrp="1"/>
+          </p:cNvSpPr>
+          <p:nvPr>
+            <p:ph type="ctrTitle"/>
+          </p:nvPr>
+        </p:nvSpPr>
+        <p:spPr/>
+        <p:txBody>
+          <a:bodyPr/>
+          <a:lstStyle/>
+          <a:p>
+            <a:r>
+              <a:rPr lang="en-US" dirty="0" smtClean="0"/>
+              <a:t>Hands-On Lab</a:t>
+            </a:r>
+            <a:endParaRPr lang="en-US" dirty="0"/>
+          </a:p>
+        </p:txBody>
+      </p:sp>
+      <p:sp>
+        <p:nvSpPr>
+          <p:cNvPr id="3" name="Subtitle 2"/>
+          <p:cNvSpPr>
+            <a:spLocks noGrp="1"/>
+          </p:cNvSpPr>
+          <p:nvPr>
+            <p:ph type="subTitle" idx="1"/>
+          </p:nvPr>
+        </p:nvSpPr>
+        <p:spPr>
+          <a:xfrm>
+            <a:off x="1889617" y="5630475"/>
+            <a:ext cx="4549819" cy="461665"/>
+          </a:xfrm>
+        </p:spPr>
+        <p:txBody>
+          <a:bodyPr/>
+          <a:lstStyle/>
+          <a:p>
+            <a:r>
+              <a:rPr lang="en-US" dirty="0" smtClean="0"/>
+              <a:t>Hadoop and Spark on Linux.pdf</a:t>
+            </a:r>
+            <a:endParaRPr lang="en-US" dirty="0"/>
+          </a:p>
+        </p:txBody>
+      </p:sp>
+      <p:sp>
+        <p:nvSpPr>
+          <p:cNvPr id="4" name="Text Placeholder 3"/>
+          <p:cNvSpPr>
+            <a:spLocks noGrp="1"/>
+          </p:cNvSpPr>
+          <p:nvPr>
+            <p:ph type="body" sz="quarter" idx="10"/>
+          </p:nvPr>
+        </p:nvSpPr>
+        <p:spPr/>
+        <p:txBody>
+          <a:bodyPr/>
+          <a:lstStyle/>
+          <a:p>
+            <a:r>
+              <a:rPr lang="en-US" dirty="0" smtClean="0"/>
+              <a:t>Hadoop and Spark on Linux</a:t>
+            </a:r>
+            <a:endParaRPr lang="en-US" dirty="0"/>
+          </a:p>
+        </p:txBody>
+      </p:sp>
+    </p:spTree>
+    <p:extLst>
+      <p:ext uri="{BB962C8B-B14F-4D97-AF65-F5344CB8AC3E}">
+        <p14:creationId xmlns:p14="http://schemas.microsoft.com/office/powerpoint/2010/main" val="2309216998"/>
+      </p:ext>
+    </p:extLst>
+  </p:cSld>
+  <p:clrMapOvr>
+    <a:masterClrMapping/>
+  </p:clrMapOvr>
+  <p:transition>
+    <p:fade/>
+  </p:transition>
+</p:sld>
+</file>
+
+<file path=ppt/slides/slide11.xml><?xml version="1.0" encoding="utf-8"?>
 <p:sld xmlns:a="http://schemas.openxmlformats.org/drawingml/2006/main" xmlns:r="http://schemas.openxmlformats.org/officeDocument/2006/relationships" xmlns:p="http://schemas.openxmlformats.org/presentationml/2006/main">
   <p:cSld>
     <p:spTree>

</xml_diff>

<commit_message>
Put I|P|SaaS graphic on intro slides. Removed A4R slides from HPC & big data
Closes #121
</commit_message>
<xml_diff>
--- a/Content/BigData/HDInsight and Big Data.pptx
+++ b/Content/BigData/HDInsight and Big Data.pptx
@@ -5,20 +5,19 @@
     <p:sldMasterId id="2147483680" r:id="rId1"/>
   </p:sldMasterIdLst>
   <p:notesMasterIdLst>
-    <p:notesMasterId r:id="rId13"/>
+    <p:notesMasterId r:id="rId12"/>
   </p:notesMasterIdLst>
   <p:sldIdLst>
     <p:sldId id="256" r:id="rId2"/>
-    <p:sldId id="257" r:id="rId3"/>
-    <p:sldId id="258" r:id="rId4"/>
-    <p:sldId id="261" r:id="rId5"/>
-    <p:sldId id="262" r:id="rId6"/>
-    <p:sldId id="259" r:id="rId7"/>
-    <p:sldId id="264" r:id="rId8"/>
-    <p:sldId id="263" r:id="rId9"/>
-    <p:sldId id="266" r:id="rId10"/>
-    <p:sldId id="267" r:id="rId11"/>
-    <p:sldId id="265" r:id="rId12"/>
+    <p:sldId id="258" r:id="rId3"/>
+    <p:sldId id="261" r:id="rId4"/>
+    <p:sldId id="262" r:id="rId5"/>
+    <p:sldId id="259" r:id="rId6"/>
+    <p:sldId id="264" r:id="rId7"/>
+    <p:sldId id="263" r:id="rId8"/>
+    <p:sldId id="266" r:id="rId9"/>
+    <p:sldId id="267" r:id="rId10"/>
+    <p:sldId id="265" r:id="rId11"/>
   </p:sldIdLst>
   <p:sldSz cx="12192000" cy="6858000"/>
   <p:notesSz cx="6858000" cy="9144000"/>
@@ -207,7 +206,7 @@
           <a:p>
             <a:fld id="{2E5CA586-3557-4985-BCD4-35EF5AC8B4A4}" type="datetimeFigureOut">
               <a:rPr lang="en-US" smtClean="0"/>
-              <a:t>9/14/2015</a:t>
+              <a:t>10/9/15</a:t>
             </a:fld>
             <a:endParaRPr lang="en-US"/>
           </a:p>
@@ -11376,113 +11375,6 @@
           <a:chExt cx="0" cy="0"/>
         </a:xfrm>
       </p:grpSpPr>
-      <p:sp>
-        <p:nvSpPr>
-          <p:cNvPr id="2" name="Title 1"/>
-          <p:cNvSpPr>
-            <a:spLocks noGrp="1"/>
-          </p:cNvSpPr>
-          <p:nvPr>
-            <p:ph type="ctrTitle"/>
-          </p:nvPr>
-        </p:nvSpPr>
-        <p:spPr/>
-        <p:txBody>
-          <a:bodyPr/>
-          <a:lstStyle/>
-          <a:p>
-            <a:r>
-              <a:rPr lang="en-US" dirty="0" smtClean="0"/>
-              <a:t>Hands-On Lab</a:t>
-            </a:r>
-            <a:endParaRPr lang="en-US" dirty="0"/>
-          </a:p>
-        </p:txBody>
-      </p:sp>
-      <p:sp>
-        <p:nvSpPr>
-          <p:cNvPr id="3" name="Subtitle 2"/>
-          <p:cNvSpPr>
-            <a:spLocks noGrp="1"/>
-          </p:cNvSpPr>
-          <p:nvPr>
-            <p:ph type="subTitle" idx="1"/>
-          </p:nvPr>
-        </p:nvSpPr>
-        <p:spPr>
-          <a:xfrm>
-            <a:off x="1889617" y="5630475"/>
-            <a:ext cx="4549819" cy="461665"/>
-          </a:xfrm>
-        </p:spPr>
-        <p:txBody>
-          <a:bodyPr/>
-          <a:lstStyle/>
-          <a:p>
-            <a:r>
-              <a:rPr lang="en-US" dirty="0" smtClean="0"/>
-              <a:t>Hadoop and Spark on Linux.pdf</a:t>
-            </a:r>
-            <a:endParaRPr lang="en-US" dirty="0"/>
-          </a:p>
-        </p:txBody>
-      </p:sp>
-      <p:sp>
-        <p:nvSpPr>
-          <p:cNvPr id="4" name="Text Placeholder 3"/>
-          <p:cNvSpPr>
-            <a:spLocks noGrp="1"/>
-          </p:cNvSpPr>
-          <p:nvPr>
-            <p:ph type="body" sz="quarter" idx="10"/>
-          </p:nvPr>
-        </p:nvSpPr>
-        <p:spPr/>
-        <p:txBody>
-          <a:bodyPr/>
-          <a:lstStyle/>
-          <a:p>
-            <a:r>
-              <a:rPr lang="en-US" dirty="0" smtClean="0"/>
-              <a:t>Hadoop and Spark on Linux</a:t>
-            </a:r>
-            <a:endParaRPr lang="en-US" dirty="0"/>
-          </a:p>
-        </p:txBody>
-      </p:sp>
-    </p:spTree>
-    <p:extLst>
-      <p:ext uri="{BB962C8B-B14F-4D97-AF65-F5344CB8AC3E}">
-        <p14:creationId xmlns:p14="http://schemas.microsoft.com/office/powerpoint/2010/main" val="2309216998"/>
-      </p:ext>
-    </p:extLst>
-  </p:cSld>
-  <p:clrMapOvr>
-    <a:masterClrMapping/>
-  </p:clrMapOvr>
-  <p:transition>
-    <p:fade/>
-  </p:transition>
-</p:sld>
-</file>
-
-<file path=ppt/slides/slide11.xml><?xml version="1.0" encoding="utf-8"?>
-<p:sld xmlns:a="http://schemas.openxmlformats.org/drawingml/2006/main" xmlns:r="http://schemas.openxmlformats.org/officeDocument/2006/relationships" xmlns:p="http://schemas.openxmlformats.org/presentationml/2006/main">
-  <p:cSld>
-    <p:spTree>
-      <p:nvGrpSpPr>
-        <p:cNvPr id="1" name=""/>
-        <p:cNvGrpSpPr/>
-        <p:nvPr/>
-      </p:nvGrpSpPr>
-      <p:grpSpPr>
-        <a:xfrm>
-          <a:off x="0" y="0"/>
-          <a:ext cx="0" cy="0"/>
-          <a:chOff x="0" y="0"/>
-          <a:chExt cx="0" cy="0"/>
-        </a:xfrm>
-      </p:grpSpPr>
     </p:spTree>
     <p:extLst>
       <p:ext uri="{BB962C8B-B14F-4D97-AF65-F5344CB8AC3E}">
@@ -11523,46 +11415,6 @@
           <a:chExt cx="0" cy="0"/>
         </a:xfrm>
       </p:grpSpPr>
-    </p:spTree>
-    <p:extLst>
-      <p:ext uri="{BB962C8B-B14F-4D97-AF65-F5344CB8AC3E}">
-        <p14:creationId xmlns:p14="http://schemas.microsoft.com/office/powerpoint/2010/main" val="566836803"/>
-      </p:ext>
-    </p:extLst>
-  </p:cSld>
-  <p:clrMapOvr>
-    <a:masterClrMapping/>
-  </p:clrMapOvr>
-  <p:transition>
-    <p:fade/>
-  </p:transition>
-  <p:timing>
-    <p:tnLst>
-      <p:par>
-        <p:cTn id="1" dur="indefinite" restart="never" nodeType="tmRoot"/>
-      </p:par>
-    </p:tnLst>
-  </p:timing>
-</p:sld>
-</file>
-
-<file path=ppt/slides/slide3.xml><?xml version="1.0" encoding="utf-8"?>
-<p:sld xmlns:a="http://schemas.openxmlformats.org/drawingml/2006/main" xmlns:r="http://schemas.openxmlformats.org/officeDocument/2006/relationships" xmlns:p="http://schemas.openxmlformats.org/presentationml/2006/main">
-  <p:cSld>
-    <p:spTree>
-      <p:nvGrpSpPr>
-        <p:cNvPr id="1" name=""/>
-        <p:cNvGrpSpPr/>
-        <p:nvPr/>
-      </p:nvGrpSpPr>
-      <p:grpSpPr>
-        <a:xfrm>
-          <a:off x="0" y="0"/>
-          <a:ext cx="0" cy="0"/>
-          <a:chOff x="0" y="0"/>
-          <a:chExt cx="0" cy="0"/>
-        </a:xfrm>
-      </p:grpSpPr>
       <p:sp>
         <p:nvSpPr>
           <p:cNvPr id="2" name="Title 1"/>
@@ -11661,7 +11513,7 @@
 </p:sld>
 </file>
 
-<file path=ppt/slides/slide4.xml><?xml version="1.0" encoding="utf-8"?>
+<file path=ppt/slides/slide3.xml><?xml version="1.0" encoding="utf-8"?>
 <p:sld xmlns:a="http://schemas.openxmlformats.org/drawingml/2006/main" xmlns:r="http://schemas.openxmlformats.org/officeDocument/2006/relationships" xmlns:p="http://schemas.openxmlformats.org/presentationml/2006/main">
   <p:cSld>
     <p:spTree>
@@ -13694,6 +13546,150 @@
 </p:sld>
 </file>
 
+<file path=ppt/slides/slide4.xml><?xml version="1.0" encoding="utf-8"?>
+<p:sld xmlns:a="http://schemas.openxmlformats.org/drawingml/2006/main" xmlns:r="http://schemas.openxmlformats.org/officeDocument/2006/relationships" xmlns:p="http://schemas.openxmlformats.org/presentationml/2006/main">
+  <p:cSld>
+    <p:spTree>
+      <p:nvGrpSpPr>
+        <p:cNvPr id="1" name=""/>
+        <p:cNvGrpSpPr/>
+        <p:nvPr/>
+      </p:nvGrpSpPr>
+      <p:grpSpPr>
+        <a:xfrm>
+          <a:off x="0" y="0"/>
+          <a:ext cx="0" cy="0"/>
+          <a:chOff x="0" y="0"/>
+          <a:chExt cx="0" cy="0"/>
+        </a:xfrm>
+      </p:grpSpPr>
+      <p:sp>
+        <p:nvSpPr>
+          <p:cNvPr id="2" name="Title 1"/>
+          <p:cNvSpPr>
+            <a:spLocks noGrp="1"/>
+          </p:cNvSpPr>
+          <p:nvPr>
+            <p:ph type="title"/>
+          </p:nvPr>
+        </p:nvSpPr>
+        <p:spPr/>
+        <p:txBody>
+          <a:bodyPr/>
+          <a:lstStyle/>
+          <a:p>
+            <a:r>
+              <a:rPr lang="en-US" dirty="0" smtClean="0"/>
+              <a:t>Features of NoSQL</a:t>
+            </a:r>
+            <a:endParaRPr lang="en-US" dirty="0"/>
+          </a:p>
+        </p:txBody>
+      </p:sp>
+      <p:sp>
+        <p:nvSpPr>
+          <p:cNvPr id="3" name="Content Placeholder 2"/>
+          <p:cNvSpPr>
+            <a:spLocks noGrp="1"/>
+          </p:cNvSpPr>
+          <p:nvPr>
+            <p:ph idx="1"/>
+          </p:nvPr>
+        </p:nvSpPr>
+        <p:spPr>
+          <a:xfrm>
+            <a:off x="519248" y="1447800"/>
+            <a:ext cx="11151916" cy="4504695"/>
+          </a:xfrm>
+        </p:spPr>
+        <p:txBody>
+          <a:bodyPr/>
+          <a:lstStyle/>
+          <a:p>
+            <a:r>
+              <a:rPr lang="en-US" dirty="0" smtClean="0"/>
+              <a:t>Unstructured Data</a:t>
+            </a:r>
+          </a:p>
+          <a:p>
+            <a:pPr lvl="1"/>
+            <a:r>
+              <a:rPr lang="en-US" dirty="0" smtClean="0"/>
+              <a:t>JSON, CSV, key-value pairs, no schema</a:t>
+            </a:r>
+          </a:p>
+          <a:p>
+            <a:r>
+              <a:rPr lang="en-US" dirty="0" smtClean="0"/>
+              <a:t>Big Data</a:t>
+            </a:r>
+          </a:p>
+          <a:p>
+            <a:pPr lvl="1"/>
+            <a:r>
+              <a:rPr lang="en-US" dirty="0" smtClean="0"/>
+              <a:t>Partitioning 1000s of shards (machines)</a:t>
+            </a:r>
+          </a:p>
+          <a:p>
+            <a:r>
+              <a:rPr lang="en-US" dirty="0" smtClean="0"/>
+              <a:t>Scale out to the cloud</a:t>
+            </a:r>
+          </a:p>
+          <a:p>
+            <a:pPr lvl="1"/>
+            <a:r>
+              <a:rPr lang="en-US" dirty="0" smtClean="0"/>
+              <a:t>Overcomes hardware limitation</a:t>
+            </a:r>
+          </a:p>
+          <a:p>
+            <a:pPr lvl="1"/>
+            <a:r>
+              <a:rPr lang="en-US" dirty="0" smtClean="0"/>
+              <a:t>Commodity hardware</a:t>
+            </a:r>
+          </a:p>
+          <a:p>
+            <a:r>
+              <a:rPr lang="en-US" dirty="0" smtClean="0"/>
+              <a:t>High Data Throughput</a:t>
+            </a:r>
+          </a:p>
+          <a:p>
+            <a:pPr lvl="1"/>
+            <a:r>
+              <a:rPr lang="en-US" dirty="0" smtClean="0"/>
+              <a:t>Replicated copies to scale read</a:t>
+            </a:r>
+            <a:endParaRPr lang="en-US" dirty="0"/>
+          </a:p>
+        </p:txBody>
+      </p:sp>
+    </p:spTree>
+    <p:extLst>
+      <p:ext uri="{BB962C8B-B14F-4D97-AF65-F5344CB8AC3E}">
+        <p14:creationId xmlns:p14="http://schemas.microsoft.com/office/powerpoint/2010/main" val="1193992711"/>
+      </p:ext>
+    </p:extLst>
+  </p:cSld>
+  <p:clrMapOvr>
+    <a:masterClrMapping/>
+  </p:clrMapOvr>
+  <p:transition>
+    <p:fade/>
+  </p:transition>
+  <p:timing>
+    <p:tnLst>
+      <p:par>
+        <p:cTn id="1" dur="indefinite" restart="never" nodeType="tmRoot"/>
+      </p:par>
+    </p:tnLst>
+  </p:timing>
+</p:sld>
+</file>
+
 <file path=ppt/slides/slide5.xml><?xml version="1.0" encoding="utf-8"?>
 <p:sld xmlns:a="http://schemas.openxmlformats.org/drawingml/2006/main" xmlns:r="http://schemas.openxmlformats.org/officeDocument/2006/relationships" xmlns:p="http://schemas.openxmlformats.org/presentationml/2006/main">
   <p:cSld>
@@ -13728,7 +13724,7 @@
           <a:p>
             <a:r>
               <a:rPr lang="en-US" dirty="0" smtClean="0"/>
-              <a:t>Features of NoSQL</a:t>
+              <a:t>What is HDInsight?</a:t>
             </a:r>
             <a:endParaRPr lang="en-US" dirty="0"/>
           </a:p>
@@ -13747,7 +13743,7 @@
         <p:spPr>
           <a:xfrm>
             <a:off x="519248" y="1447800"/>
-            <a:ext cx="11151916" cy="4504695"/>
+            <a:ext cx="11151916" cy="4203074"/>
           </a:xfrm>
         </p:spPr>
         <p:txBody>
@@ -13756,60 +13752,53 @@
           <a:p>
             <a:r>
               <a:rPr lang="en-US" dirty="0" smtClean="0"/>
-              <a:t>Unstructured Data</a:t>
+              <a:t>Microsoft Azure’s big data solution using Hadoop</a:t>
+            </a:r>
+          </a:p>
+          <a:p>
+            <a:r>
+              <a:rPr lang="en-US" dirty="0" smtClean="0"/>
+              <a:t>What is Hadoop?</a:t>
             </a:r>
           </a:p>
           <a:p>
             <a:pPr lvl="1"/>
             <a:r>
+              <a:rPr lang="en-US" dirty="0"/>
+              <a:t>Open-source software for  storing and analyzing massive amounts of structured and unstructured </a:t>
+            </a:r>
+            <a:r>
               <a:rPr lang="en-US" dirty="0" smtClean="0"/>
-              <a:t>JSON, CSV, key-value pairs, no schema</a:t>
-            </a:r>
+              <a:t>data… </a:t>
+            </a:r>
+            <a:r>
+              <a:rPr lang="en-US" dirty="0"/>
+              <a:t>Hadoop can process big, messy data sets for insights and answers–which helps explain all the buzz around it.</a:t>
+            </a:r>
+            <a:endParaRPr lang="en-US" dirty="0" smtClean="0"/>
           </a:p>
           <a:p>
             <a:r>
               <a:rPr lang="en-US" dirty="0" smtClean="0"/>
-              <a:t>Big Data</a:t>
-            </a:r>
-          </a:p>
-          <a:p>
-            <a:pPr lvl="1"/>
+              <a:t>HDInsight deploys the open source </a:t>
+            </a:r>
+            <a:r>
+              <a:rPr lang="en-US" dirty="0" err="1" smtClean="0"/>
+              <a:t>Hortonworks</a:t>
+            </a:r>
+            <a:r>
+              <a:rPr lang="en-US" dirty="0"/>
+              <a:t> </a:t>
+            </a:r>
             <a:r>
               <a:rPr lang="en-US" dirty="0" smtClean="0"/>
-              <a:t>Partitioning 1000s of shards (machines)</a:t>
+              <a:t>Data Platform Hadoop implementation</a:t>
             </a:r>
           </a:p>
           <a:p>
             <a:r>
               <a:rPr lang="en-US" dirty="0" smtClean="0"/>
-              <a:t>Scale out to the cloud</a:t>
-            </a:r>
-          </a:p>
-          <a:p>
-            <a:pPr lvl="1"/>
-            <a:r>
-              <a:rPr lang="en-US" dirty="0" smtClean="0"/>
-              <a:t>Overcomes hardware limitation</a:t>
-            </a:r>
-          </a:p>
-          <a:p>
-            <a:pPr lvl="1"/>
-            <a:r>
-              <a:rPr lang="en-US" dirty="0" smtClean="0"/>
-              <a:t>Commodity hardware</a:t>
-            </a:r>
-          </a:p>
-          <a:p>
-            <a:r>
-              <a:rPr lang="en-US" dirty="0" smtClean="0"/>
-              <a:t>High Data Throughput</a:t>
-            </a:r>
-          </a:p>
-          <a:p>
-            <a:pPr lvl="1"/>
-            <a:r>
-              <a:rPr lang="en-US" dirty="0" smtClean="0"/>
-              <a:t>Replicated copies to scale read</a:t>
+              <a:t>Supports both Linux (Ubuntu Server) and Windows as cluster machines</a:t>
             </a:r>
             <a:endParaRPr lang="en-US" dirty="0"/>
           </a:p>
@@ -13818,7 +13807,7 @@
     </p:spTree>
     <p:extLst>
       <p:ext uri="{BB962C8B-B14F-4D97-AF65-F5344CB8AC3E}">
-        <p14:creationId xmlns:p14="http://schemas.microsoft.com/office/powerpoint/2010/main" val="1193992711"/>
+        <p14:creationId xmlns:p14="http://schemas.microsoft.com/office/powerpoint/2010/main" val="840578556"/>
       </p:ext>
     </p:extLst>
   </p:cSld>
@@ -13872,7 +13861,7 @@
           <a:p>
             <a:r>
               <a:rPr lang="en-US" dirty="0" smtClean="0"/>
-              <a:t>What is HDInsight?</a:t>
+              <a:t>Types of HDInsight Clusters</a:t>
             </a:r>
             <a:endParaRPr lang="en-US" dirty="0"/>
           </a:p>
@@ -13891,7 +13880,7 @@
         <p:spPr>
           <a:xfrm>
             <a:off x="519248" y="1447800"/>
-            <a:ext cx="11151916" cy="4203074"/>
+            <a:ext cx="11151916" cy="4418517"/>
           </a:xfrm>
         </p:spPr>
         <p:txBody>
@@ -13900,53 +13889,69 @@
           <a:p>
             <a:r>
               <a:rPr lang="en-US" dirty="0" smtClean="0"/>
-              <a:t>Microsoft Azure’s big data solution using Hadoop</a:t>
-            </a:r>
-          </a:p>
-          <a:p>
+              <a:t>Hadoop: the “Query” workload</a:t>
+            </a:r>
+          </a:p>
+          <a:p>
+            <a:pPr lvl="1"/>
             <a:r>
               <a:rPr lang="en-US" dirty="0" smtClean="0"/>
-              <a:t>What is Hadoop?</a:t>
+              <a:t>Reliable data storage with HDFS, simple </a:t>
+            </a:r>
+            <a:r>
+              <a:rPr lang="en-US" dirty="0" err="1" smtClean="0"/>
+              <a:t>MapReduce</a:t>
+            </a:r>
+            <a:r>
+              <a:rPr lang="en-US" dirty="0" smtClean="0"/>
+              <a:t> model</a:t>
+            </a:r>
+          </a:p>
+          <a:p>
+            <a:r>
+              <a:rPr lang="en-US" dirty="0" err="1" smtClean="0"/>
+              <a:t>HBase</a:t>
+            </a:r>
+            <a:r>
+              <a:rPr lang="en-US" dirty="0" smtClean="0"/>
+              <a:t>: the “NoSQL” workload</a:t>
             </a:r>
           </a:p>
           <a:p>
             <a:pPr lvl="1"/>
             <a:r>
-              <a:rPr lang="en-US" dirty="0"/>
-              <a:t>Open-source software for  storing and analyzing massive amounts of structured and unstructured </a:t>
-            </a:r>
-            <a:r>
               <a:rPr lang="en-US" dirty="0" smtClean="0"/>
-              <a:t>data… </a:t>
-            </a:r>
-            <a:r>
-              <a:rPr lang="en-US" dirty="0"/>
-              <a:t>Hadoop can process big, messy data sets for insights and answers–which helps explain all the buzz around it.</a:t>
-            </a:r>
-            <a:endParaRPr lang="en-US" dirty="0" smtClean="0"/>
+              <a:t>Provides random access &amp; consistency for large amounts of unstructured data</a:t>
+            </a:r>
           </a:p>
           <a:p>
             <a:r>
               <a:rPr lang="en-US" dirty="0" smtClean="0"/>
-              <a:t>HDInsight deploys the open source </a:t>
+              <a:t>Apache Storm: the “Stream” workload</a:t>
+            </a:r>
+          </a:p>
+          <a:p>
+            <a:pPr lvl="1"/>
+            <a:r>
+              <a:rPr lang="en-US" dirty="0" smtClean="0"/>
+              <a:t>Distributes real-time computation for large streams of data fast</a:t>
+            </a:r>
+          </a:p>
+          <a:p>
+            <a:r>
+              <a:rPr lang="en-US" dirty="0" smtClean="0"/>
+              <a:t>Apache Spark: the “Parallel Processing in Memory” workload</a:t>
+            </a:r>
+          </a:p>
+          <a:p>
+            <a:pPr lvl="1"/>
+            <a:r>
+              <a:rPr lang="en-US" dirty="0" smtClean="0"/>
+              <a:t>Comes with Zeppelin and </a:t>
             </a:r>
             <a:r>
               <a:rPr lang="en-US" dirty="0" err="1" smtClean="0"/>
-              <a:t>Hortonworks</a:t>
-            </a:r>
-            <a:r>
-              <a:rPr lang="en-US" dirty="0"/>
-              <a:t> </a:t>
-            </a:r>
-            <a:r>
-              <a:rPr lang="en-US" dirty="0" smtClean="0"/>
-              <a:t>Data Platform Hadoop implementation</a:t>
-            </a:r>
-          </a:p>
-          <a:p>
-            <a:r>
-              <a:rPr lang="en-US" dirty="0" smtClean="0"/>
-              <a:t>Supports both Linux (Ubuntu Server) and Windows as cluster machines</a:t>
+              <a:t>Jupyter</a:t>
             </a:r>
             <a:endParaRPr lang="en-US" dirty="0"/>
           </a:p>
@@ -13955,7 +13960,7 @@
     </p:spTree>
     <p:extLst>
       <p:ext uri="{BB962C8B-B14F-4D97-AF65-F5344CB8AC3E}">
-        <p14:creationId xmlns:p14="http://schemas.microsoft.com/office/powerpoint/2010/main" val="840578556"/>
+        <p14:creationId xmlns:p14="http://schemas.microsoft.com/office/powerpoint/2010/main" val="1224957982"/>
       </p:ext>
     </p:extLst>
   </p:cSld>
@@ -14009,7 +14014,7 @@
           <a:p>
             <a:r>
               <a:rPr lang="en-US" dirty="0" smtClean="0"/>
-              <a:t>Types of HDInsight Clusters</a:t>
+              <a:t>What are the Hadoop Components?</a:t>
             </a:r>
             <a:endParaRPr lang="en-US" dirty="0"/>
           </a:p>
@@ -14017,18 +14022,18 @@
       </p:sp>
       <p:sp>
         <p:nvSpPr>
-          <p:cNvPr id="3" name="Content Placeholder 2"/>
+          <p:cNvPr id="4" name="Content Placeholder 3"/>
           <p:cNvSpPr>
             <a:spLocks noGrp="1"/>
           </p:cNvSpPr>
           <p:nvPr>
-            <p:ph idx="1"/>
+            <p:ph sz="half" idx="2"/>
           </p:nvPr>
         </p:nvSpPr>
         <p:spPr>
           <a:xfrm>
-            <a:off x="519248" y="1447800"/>
-            <a:ext cx="11151916" cy="4418517"/>
+            <a:off x="519249" y="1447800"/>
+            <a:ext cx="5486400" cy="4321183"/>
           </a:xfrm>
         </p:spPr>
         <p:txBody>
@@ -14036,79 +14041,208 @@
           <a:lstStyle/>
           <a:p>
             <a:r>
-              <a:rPr lang="en-US" dirty="0" smtClean="0"/>
-              <a:t>Hadoop: the “Query” workload</a:t>
-            </a:r>
+              <a:rPr lang="en-US" sz="2400" dirty="0" err="1" smtClean="0"/>
+              <a:t>Ambari</a:t>
+            </a:r>
+            <a:endParaRPr lang="en-US" sz="2400" dirty="0" smtClean="0"/>
           </a:p>
           <a:p>
             <a:pPr lvl="1"/>
             <a:r>
-              <a:rPr lang="en-US" dirty="0" smtClean="0"/>
-              <a:t>Reliable data storage with HDFS, simple </a:t>
-            </a:r>
-            <a:r>
-              <a:rPr lang="en-US" dirty="0" err="1" smtClean="0"/>
+              <a:rPr lang="en-US" sz="2400" dirty="0" smtClean="0"/>
+              <a:t>Cluster management</a:t>
+            </a:r>
+          </a:p>
+          <a:p>
+            <a:r>
+              <a:rPr lang="en-US" sz="2400" dirty="0" smtClean="0"/>
+              <a:t>Avro</a:t>
+            </a:r>
+          </a:p>
+          <a:p>
+            <a:pPr lvl="1"/>
+            <a:r>
+              <a:rPr lang="en-US" sz="2400" dirty="0" smtClean="0"/>
+              <a:t>Data serialization for .NET</a:t>
+            </a:r>
+          </a:p>
+          <a:p>
+            <a:r>
+              <a:rPr lang="en-US" sz="2400" dirty="0" smtClean="0"/>
+              <a:t>Hive &amp; </a:t>
+            </a:r>
+            <a:r>
+              <a:rPr lang="en-US" sz="2400" dirty="0" err="1" smtClean="0"/>
+              <a:t>HCatalog</a:t>
+            </a:r>
+            <a:endParaRPr lang="en-US" sz="2400" dirty="0" smtClean="0"/>
+          </a:p>
+          <a:p>
+            <a:pPr lvl="1"/>
+            <a:r>
+              <a:rPr lang="en-US" sz="2400" dirty="0" smtClean="0"/>
+              <a:t>SQL-like querying + management</a:t>
+            </a:r>
+          </a:p>
+          <a:p>
+            <a:r>
+              <a:rPr lang="en-US" sz="2400" dirty="0" smtClean="0"/>
+              <a:t>Mahout</a:t>
+            </a:r>
+          </a:p>
+          <a:p>
+            <a:pPr lvl="1"/>
+            <a:r>
+              <a:rPr lang="en-US" sz="2400" dirty="0" smtClean="0"/>
+              <a:t>Machine learning</a:t>
+            </a:r>
+          </a:p>
+          <a:p>
+            <a:r>
+              <a:rPr lang="en-US" sz="2400" dirty="0" err="1" smtClean="0"/>
               <a:t>MapReduce</a:t>
             </a:r>
             <a:r>
-              <a:rPr lang="en-US" dirty="0" smtClean="0"/>
-              <a:t> model</a:t>
-            </a:r>
-          </a:p>
-          <a:p>
-            <a:r>
-              <a:rPr lang="en-US" dirty="0" err="1" smtClean="0"/>
+              <a:rPr lang="en-US" sz="2400" dirty="0" smtClean="0"/>
+              <a:t> &amp; YARN</a:t>
+            </a:r>
+          </a:p>
+          <a:p>
+            <a:pPr lvl="1"/>
+            <a:r>
+              <a:rPr lang="en-US" sz="2400" dirty="0" smtClean="0"/>
+              <a:t>Distributed processing + resource management</a:t>
+            </a:r>
+            <a:endParaRPr lang="en-US" sz="2400" dirty="0"/>
+          </a:p>
+        </p:txBody>
+      </p:sp>
+      <p:sp>
+        <p:nvSpPr>
+          <p:cNvPr id="9" name="Content Placeholder 3"/>
+          <p:cNvSpPr>
+            <a:spLocks noGrp="1"/>
+          </p:cNvSpPr>
+          <p:nvPr>
+            <p:ph sz="half" idx="2"/>
+          </p:nvPr>
+        </p:nvSpPr>
+        <p:spPr>
+          <a:xfrm>
+            <a:off x="6184766" y="1447800"/>
+            <a:ext cx="5486400" cy="4801314"/>
+          </a:xfrm>
+        </p:spPr>
+        <p:txBody>
+          <a:bodyPr/>
+          <a:lstStyle/>
+          <a:p>
+            <a:r>
+              <a:rPr lang="en-US" sz="2400" dirty="0" err="1" smtClean="0"/>
+              <a:t>Oozie</a:t>
+            </a:r>
+            <a:endParaRPr lang="en-US" sz="2400" dirty="0" smtClean="0"/>
+          </a:p>
+          <a:p>
+            <a:pPr lvl="1"/>
+            <a:r>
+              <a:rPr lang="en-US" sz="2400" dirty="0" smtClean="0"/>
+              <a:t>Workflow management</a:t>
+            </a:r>
+          </a:p>
+          <a:p>
+            <a:r>
+              <a:rPr lang="en-US" sz="2400" dirty="0" smtClean="0"/>
+              <a:t>Phoenix</a:t>
+            </a:r>
+          </a:p>
+          <a:p>
+            <a:pPr lvl="1"/>
+            <a:r>
+              <a:rPr lang="en-US" sz="2400" dirty="0" smtClean="0"/>
+              <a:t>Relation DB over </a:t>
+            </a:r>
+            <a:r>
+              <a:rPr lang="en-US" sz="2400" dirty="0" err="1" smtClean="0"/>
               <a:t>HBase</a:t>
             </a:r>
-            <a:r>
-              <a:rPr lang="en-US" dirty="0" smtClean="0"/>
-              <a:t>: the “NoSQL” workload</a:t>
+            <a:endParaRPr lang="en-US" sz="2400" dirty="0" smtClean="0"/>
+          </a:p>
+          <a:p>
+            <a:r>
+              <a:rPr lang="en-US" sz="2400" dirty="0" smtClean="0"/>
+              <a:t>Pig</a:t>
             </a:r>
           </a:p>
           <a:p>
             <a:pPr lvl="1"/>
             <a:r>
-              <a:rPr lang="en-US" dirty="0" smtClean="0"/>
-              <a:t>Provides random access &amp; consistency for large amounts of unstructured data</a:t>
-            </a:r>
-          </a:p>
-          <a:p>
-            <a:r>
-              <a:rPr lang="en-US" dirty="0" smtClean="0"/>
-              <a:t>Apache Storm: the “Stream” workload</a:t>
-            </a:r>
+              <a:rPr lang="en-US" sz="2400" dirty="0" smtClean="0"/>
+              <a:t>Simpler </a:t>
+            </a:r>
+            <a:r>
+              <a:rPr lang="en-US" sz="2400" dirty="0" err="1" smtClean="0"/>
+              <a:t>MapReduce</a:t>
+            </a:r>
+            <a:r>
+              <a:rPr lang="en-US" sz="2400" dirty="0" smtClean="0"/>
+              <a:t> transforms</a:t>
+            </a:r>
+          </a:p>
+          <a:p>
+            <a:r>
+              <a:rPr lang="en-US" sz="2400" dirty="0" err="1" smtClean="0"/>
+              <a:t>Sqoop</a:t>
+            </a:r>
+            <a:endParaRPr lang="en-US" sz="2400" dirty="0" smtClean="0"/>
           </a:p>
           <a:p>
             <a:pPr lvl="1"/>
             <a:r>
-              <a:rPr lang="en-US" dirty="0" smtClean="0"/>
-              <a:t>Distributes real-time computation for large streams of data fast</a:t>
-            </a:r>
-          </a:p>
-          <a:p>
-            <a:r>
-              <a:rPr lang="en-US" dirty="0" smtClean="0"/>
-              <a:t>Apache Spark: the “Parallel Processing in Memory” workload</a:t>
-            </a:r>
+              <a:rPr lang="en-US" sz="2400" dirty="0" smtClean="0"/>
+              <a:t>Data import/export</a:t>
+            </a:r>
+          </a:p>
+          <a:p>
+            <a:r>
+              <a:rPr lang="en-US" sz="2400" dirty="0" err="1" smtClean="0"/>
+              <a:t>Tez</a:t>
+            </a:r>
+            <a:endParaRPr lang="en-US" sz="2400" dirty="0" smtClean="0"/>
           </a:p>
           <a:p>
             <a:pPr lvl="1"/>
             <a:r>
-              <a:rPr lang="en-US" dirty="0" smtClean="0"/>
-              <a:t>Comes with Zeppelin and </a:t>
-            </a:r>
-            <a:r>
-              <a:rPr lang="en-US" dirty="0" err="1" smtClean="0"/>
-              <a:t>Jupyter</a:t>
-            </a:r>
-            <a:endParaRPr lang="en-US" dirty="0"/>
+              <a:rPr lang="en-US" sz="2400" dirty="0" smtClean="0"/>
+              <a:t>Data-intensive </a:t>
+            </a:r>
+            <a:r>
+              <a:rPr lang="en-US" sz="2400" dirty="0" err="1" smtClean="0"/>
+              <a:t>effieciency</a:t>
+            </a:r>
+            <a:endParaRPr lang="en-US" sz="2400" dirty="0" smtClean="0"/>
+          </a:p>
+          <a:p>
+            <a:r>
+              <a:rPr lang="en-US" sz="2400" dirty="0" err="1" smtClean="0"/>
+              <a:t>ZooKeeper</a:t>
+            </a:r>
+            <a:endParaRPr lang="en-US" sz="2400" dirty="0" smtClean="0"/>
+          </a:p>
+          <a:p>
+            <a:pPr lvl="1"/>
+            <a:r>
+              <a:rPr lang="en-US" sz="2400" dirty="0" smtClean="0"/>
+              <a:t>Coordinator of distributed processes</a:t>
+            </a:r>
+            <a:endParaRPr lang="en-US" sz="2400" dirty="0"/>
           </a:p>
         </p:txBody>
       </p:sp>
     </p:spTree>
     <p:extLst>
       <p:ext uri="{BB962C8B-B14F-4D97-AF65-F5344CB8AC3E}">
-        <p14:creationId xmlns:p14="http://schemas.microsoft.com/office/powerpoint/2010/main" val="1224957982"/>
+        <p14:creationId xmlns:p14="http://schemas.microsoft.com/office/powerpoint/2010/main" val="1433345521"/>
       </p:ext>
     </p:extLst>
   </p:cSld>
@@ -14162,7 +14296,7 @@
           <a:p>
             <a:r>
               <a:rPr lang="en-US" dirty="0" smtClean="0"/>
-              <a:t>What are the Hadoop Components?</a:t>
+              <a:t>Items of Note About HDInsight</a:t>
             </a:r>
             <a:endParaRPr lang="en-US" dirty="0"/>
           </a:p>
@@ -14170,18 +14304,18 @@
       </p:sp>
       <p:sp>
         <p:nvSpPr>
-          <p:cNvPr id="4" name="Content Placeholder 3"/>
+          <p:cNvPr id="3" name="Content Placeholder 2"/>
           <p:cNvSpPr>
             <a:spLocks noGrp="1"/>
           </p:cNvSpPr>
           <p:nvPr>
-            <p:ph sz="half" idx="2"/>
+            <p:ph idx="1"/>
           </p:nvPr>
         </p:nvSpPr>
         <p:spPr>
           <a:xfrm>
-            <a:off x="519249" y="1447800"/>
-            <a:ext cx="5486400" cy="4321183"/>
+            <a:off x="519248" y="1447800"/>
+            <a:ext cx="11151916" cy="4812343"/>
           </a:xfrm>
         </p:spPr>
         <p:txBody>
@@ -14189,208 +14323,87 @@
           <a:lstStyle/>
           <a:p>
             <a:r>
-              <a:rPr lang="en-US" sz="2400" dirty="0" err="1" smtClean="0"/>
-              <a:t>Ambari</a:t>
-            </a:r>
-            <a:endParaRPr lang="en-US" sz="2400" dirty="0" smtClean="0"/>
+              <a:rPr lang="en-US" dirty="0" smtClean="0"/>
+              <a:t>The Hadoop Distributed File System (HDFS) is mapped to blob storage</a:t>
+            </a:r>
           </a:p>
           <a:p>
             <a:pPr lvl="1"/>
             <a:r>
-              <a:rPr lang="en-US" sz="2400" dirty="0" smtClean="0"/>
-              <a:t>Cluster management</a:t>
-            </a:r>
-          </a:p>
-          <a:p>
-            <a:r>
-              <a:rPr lang="en-US" sz="2400" dirty="0" smtClean="0"/>
-              <a:t>Avro</a:t>
+              <a:rPr lang="en-US" dirty="0" smtClean="0"/>
+              <a:t>Access through “</a:t>
+            </a:r>
+            <a:r>
+              <a:rPr lang="en-US" dirty="0" err="1" smtClean="0"/>
+              <a:t>wasb</a:t>
+            </a:r>
+            <a:r>
+              <a:rPr lang="en-US" dirty="0" smtClean="0"/>
+              <a:t>:\\” in your code</a:t>
             </a:r>
           </a:p>
           <a:p>
             <a:pPr lvl="1"/>
             <a:r>
-              <a:rPr lang="en-US" sz="2400" dirty="0" smtClean="0"/>
-              <a:t>Data serialization for .NET</a:t>
-            </a:r>
-          </a:p>
-          <a:p>
-            <a:r>
-              <a:rPr lang="en-US" sz="2400" dirty="0" smtClean="0"/>
-              <a:t>Hive &amp; </a:t>
-            </a:r>
-            <a:r>
-              <a:rPr lang="en-US" sz="2400" dirty="0" err="1" smtClean="0"/>
-              <a:t>HCatalog</a:t>
-            </a:r>
-            <a:endParaRPr lang="en-US" sz="2400" dirty="0" smtClean="0"/>
+              <a:rPr lang="en-US" dirty="0" smtClean="0"/>
+              <a:t>Most HDFS commands work (except OS specific ones like </a:t>
+            </a:r>
+            <a:r>
+              <a:rPr lang="en-US" dirty="0" err="1" smtClean="0"/>
+              <a:t>fschk</a:t>
+            </a:r>
+            <a:r>
+              <a:rPr lang="en-US" dirty="0" smtClean="0"/>
+              <a:t>)</a:t>
+            </a:r>
+          </a:p>
+          <a:p>
+            <a:r>
+              <a:rPr lang="en-US" dirty="0" smtClean="0"/>
+              <a:t>Can deploy from the portal, but use scripting in the real world</a:t>
+            </a:r>
           </a:p>
           <a:p>
             <a:pPr lvl="1"/>
             <a:r>
-              <a:rPr lang="en-US" sz="2400" dirty="0" smtClean="0"/>
-              <a:t>SQL-like querying + management</a:t>
-            </a:r>
-          </a:p>
-          <a:p>
-            <a:r>
-              <a:rPr lang="en-US" sz="2400" dirty="0" smtClean="0"/>
-              <a:t>Mahout</a:t>
+              <a:rPr lang="en-US" dirty="0" smtClean="0"/>
+              <a:t>Offers advanced customization</a:t>
             </a:r>
           </a:p>
           <a:p>
             <a:pPr lvl="1"/>
             <a:r>
-              <a:rPr lang="en-US" sz="2400" dirty="0" smtClean="0"/>
-              <a:t>Machine learning</a:t>
-            </a:r>
-          </a:p>
-          <a:p>
-            <a:r>
-              <a:rPr lang="en-US" sz="2400" dirty="0" err="1" smtClean="0"/>
-              <a:t>MapReduce</a:t>
-            </a:r>
-            <a:r>
-              <a:rPr lang="en-US" sz="2400" dirty="0" smtClean="0"/>
-              <a:t> &amp; YARN</a:t>
+              <a:rPr lang="en-US" dirty="0" smtClean="0"/>
+              <a:t>Easier creation/deletion</a:t>
+            </a:r>
+          </a:p>
+          <a:p>
+            <a:r>
+              <a:rPr lang="en-US" dirty="0" smtClean="0"/>
+              <a:t>There is no “suspend” on HDInsight clusters</a:t>
             </a:r>
           </a:p>
           <a:p>
             <a:pPr lvl="1"/>
             <a:r>
-              <a:rPr lang="en-US" sz="2400" dirty="0" smtClean="0"/>
-              <a:t>Distributed processing + resource management</a:t>
-            </a:r>
-            <a:endParaRPr lang="en-US" sz="2400" dirty="0"/>
-          </a:p>
-        </p:txBody>
-      </p:sp>
-      <p:sp>
-        <p:nvSpPr>
-          <p:cNvPr id="9" name="Content Placeholder 3"/>
-          <p:cNvSpPr>
-            <a:spLocks noGrp="1"/>
-          </p:cNvSpPr>
-          <p:nvPr>
-            <p:ph sz="half" idx="2"/>
-          </p:nvPr>
-        </p:nvSpPr>
-        <p:spPr>
-          <a:xfrm>
-            <a:off x="6184766" y="1447800"/>
-            <a:ext cx="5486400" cy="4801314"/>
-          </a:xfrm>
-        </p:spPr>
-        <p:txBody>
-          <a:bodyPr/>
-          <a:lstStyle/>
-          <a:p>
-            <a:r>
-              <a:rPr lang="en-US" sz="2400" dirty="0" err="1" smtClean="0"/>
-              <a:t>Oozie</a:t>
-            </a:r>
-            <a:endParaRPr lang="en-US" sz="2400" dirty="0" smtClean="0"/>
+              <a:rPr lang="en-US" dirty="0" smtClean="0"/>
+              <a:t>You delete the cluster when finished</a:t>
+            </a:r>
           </a:p>
           <a:p>
             <a:pPr lvl="1"/>
             <a:r>
-              <a:rPr lang="en-US" sz="2400" dirty="0" smtClean="0"/>
-              <a:t>Workflow management</a:t>
-            </a:r>
-          </a:p>
-          <a:p>
-            <a:r>
-              <a:rPr lang="en-US" sz="2400" dirty="0" smtClean="0"/>
-              <a:t>Phoenix</a:t>
-            </a:r>
-          </a:p>
-          <a:p>
-            <a:pPr lvl="1"/>
-            <a:r>
-              <a:rPr lang="en-US" sz="2400" dirty="0" smtClean="0"/>
-              <a:t>Relation DB over </a:t>
-            </a:r>
-            <a:r>
-              <a:rPr lang="en-US" sz="2400" dirty="0" err="1" smtClean="0"/>
-              <a:t>HBase</a:t>
-            </a:r>
-            <a:endParaRPr lang="en-US" sz="2400" dirty="0" smtClean="0"/>
-          </a:p>
-          <a:p>
-            <a:r>
-              <a:rPr lang="en-US" sz="2400" dirty="0" smtClean="0"/>
-              <a:t>Pig</a:t>
-            </a:r>
-          </a:p>
-          <a:p>
-            <a:pPr lvl="1"/>
-            <a:r>
-              <a:rPr lang="en-US" sz="2400" dirty="0" smtClean="0"/>
-              <a:t>Simpler </a:t>
-            </a:r>
-            <a:r>
-              <a:rPr lang="en-US" sz="2400" dirty="0" err="1" smtClean="0"/>
-              <a:t>MapReduce</a:t>
-            </a:r>
-            <a:r>
-              <a:rPr lang="en-US" sz="2400" dirty="0" smtClean="0"/>
-              <a:t> transforms</a:t>
-            </a:r>
-          </a:p>
-          <a:p>
-            <a:r>
-              <a:rPr lang="en-US" sz="2400" dirty="0" err="1" smtClean="0"/>
-              <a:t>Sqoop</a:t>
-            </a:r>
-            <a:endParaRPr lang="en-US" sz="2400" dirty="0" smtClean="0"/>
-          </a:p>
-          <a:p>
-            <a:pPr lvl="1"/>
-            <a:r>
-              <a:rPr lang="en-US" sz="2400" dirty="0" smtClean="0"/>
-              <a:t>Data import/export</a:t>
-            </a:r>
-          </a:p>
-          <a:p>
-            <a:r>
-              <a:rPr lang="en-US" sz="2400" dirty="0" err="1" smtClean="0"/>
-              <a:t>Tez</a:t>
-            </a:r>
-            <a:endParaRPr lang="en-US" sz="2400" dirty="0" smtClean="0"/>
-          </a:p>
-          <a:p>
-            <a:pPr lvl="1"/>
-            <a:r>
-              <a:rPr lang="en-US" sz="2400" dirty="0" smtClean="0"/>
-              <a:t>Data-intensive </a:t>
-            </a:r>
-            <a:r>
-              <a:rPr lang="en-US" sz="2400" dirty="0" err="1" smtClean="0"/>
-              <a:t>effieciency</a:t>
-            </a:r>
-            <a:endParaRPr lang="en-US" sz="2400" dirty="0" smtClean="0"/>
-          </a:p>
-          <a:p>
-            <a:r>
-              <a:rPr lang="en-US" sz="2400" dirty="0" err="1" smtClean="0"/>
-              <a:t>ZooKeeper</a:t>
-            </a:r>
-            <a:endParaRPr lang="en-US" sz="2400" dirty="0" smtClean="0"/>
-          </a:p>
-          <a:p>
-            <a:pPr lvl="1"/>
-            <a:r>
-              <a:rPr lang="en-US" sz="2400" dirty="0" smtClean="0"/>
-              <a:t>Coordinator of distributed processes</a:t>
-            </a:r>
-            <a:endParaRPr lang="en-US" sz="2400" dirty="0"/>
+              <a:rPr lang="en-US" dirty="0" smtClean="0"/>
+              <a:t>Does not delete your data as that’s in blob storage!</a:t>
+            </a:r>
+            <a:endParaRPr lang="en-US" dirty="0"/>
           </a:p>
         </p:txBody>
       </p:sp>
     </p:spTree>
     <p:extLst>
       <p:ext uri="{BB962C8B-B14F-4D97-AF65-F5344CB8AC3E}">
-        <p14:creationId xmlns:p14="http://schemas.microsoft.com/office/powerpoint/2010/main" val="1433345521"/>
+        <p14:creationId xmlns:p14="http://schemas.microsoft.com/office/powerpoint/2010/main" val="258416317"/>
       </p:ext>
     </p:extLst>
   </p:cSld>
@@ -14434,7 +14447,7 @@
             <a:spLocks noGrp="1"/>
           </p:cNvSpPr>
           <p:nvPr>
-            <p:ph type="title"/>
+            <p:ph type="ctrTitle"/>
           </p:nvPr>
         </p:nvSpPr>
         <p:spPr/>
@@ -14444,7 +14457,7 @@
           <a:p>
             <a:r>
               <a:rPr lang="en-US" dirty="0" smtClean="0"/>
-              <a:t>Items of Note About HDInsight</a:t>
+              <a:t>Hands-On Lab</a:t>
             </a:r>
             <a:endParaRPr lang="en-US" dirty="0"/>
           </a:p>
@@ -14452,18 +14465,18 @@
       </p:sp>
       <p:sp>
         <p:nvSpPr>
-          <p:cNvPr id="3" name="Content Placeholder 2"/>
+          <p:cNvPr id="3" name="Subtitle 2"/>
           <p:cNvSpPr>
             <a:spLocks noGrp="1"/>
           </p:cNvSpPr>
           <p:nvPr>
-            <p:ph idx="1"/>
+            <p:ph type="subTitle" idx="1"/>
           </p:nvPr>
         </p:nvSpPr>
         <p:spPr>
           <a:xfrm>
-            <a:off x="519248" y="1447800"/>
-            <a:ext cx="11151916" cy="4812343"/>
+            <a:off x="1889617" y="5630475"/>
+            <a:ext cx="4549819" cy="461665"/>
           </a:xfrm>
         </p:spPr>
         <p:txBody>
@@ -14472,77 +14485,30 @@
           <a:p>
             <a:r>
               <a:rPr lang="en-US" dirty="0" smtClean="0"/>
-              <a:t>The Hadoop Distributed File System (HDFS) is mapped to blob storage</a:t>
-            </a:r>
-          </a:p>
-          <a:p>
-            <a:pPr lvl="1"/>
+              <a:t>Hadoop and Spark on Linux.pdf</a:t>
+            </a:r>
+            <a:endParaRPr lang="en-US" dirty="0"/>
+          </a:p>
+        </p:txBody>
+      </p:sp>
+      <p:sp>
+        <p:nvSpPr>
+          <p:cNvPr id="4" name="Text Placeholder 3"/>
+          <p:cNvSpPr>
+            <a:spLocks noGrp="1"/>
+          </p:cNvSpPr>
+          <p:nvPr>
+            <p:ph type="body" sz="quarter" idx="10"/>
+          </p:nvPr>
+        </p:nvSpPr>
+        <p:spPr/>
+        <p:txBody>
+          <a:bodyPr/>
+          <a:lstStyle/>
+          <a:p>
             <a:r>
               <a:rPr lang="en-US" dirty="0" smtClean="0"/>
-              <a:t>Access through “</a:t>
-            </a:r>
-            <a:r>
-              <a:rPr lang="en-US" dirty="0" err="1" smtClean="0"/>
-              <a:t>wasb</a:t>
-            </a:r>
-            <a:r>
-              <a:rPr lang="en-US" dirty="0" smtClean="0"/>
-              <a:t>:\\” in your code</a:t>
-            </a:r>
-          </a:p>
-          <a:p>
-            <a:pPr lvl="1"/>
-            <a:r>
-              <a:rPr lang="en-US" dirty="0" smtClean="0"/>
-              <a:t>Most HDFS commands work (except OS specific ones like </a:t>
-            </a:r>
-            <a:r>
-              <a:rPr lang="en-US" dirty="0" err="1" smtClean="0"/>
-              <a:t>fschk</a:t>
-            </a:r>
-            <a:r>
-              <a:rPr lang="en-US" dirty="0" smtClean="0"/>
-              <a:t>)</a:t>
-            </a:r>
-          </a:p>
-          <a:p>
-            <a:r>
-              <a:rPr lang="en-US" dirty="0" smtClean="0"/>
-              <a:t>Can deploy from the portal, but use scripting in the real world</a:t>
-            </a:r>
-          </a:p>
-          <a:p>
-            <a:pPr lvl="1"/>
-            <a:r>
-              <a:rPr lang="en-US" dirty="0" smtClean="0"/>
-              <a:t>Offers advanced customization</a:t>
-            </a:r>
-          </a:p>
-          <a:p>
-            <a:pPr lvl="1"/>
-            <a:r>
-              <a:rPr lang="en-US" dirty="0" smtClean="0"/>
-              <a:t>Easier creation/deletion</a:t>
-            </a:r>
-          </a:p>
-          <a:p>
-            <a:r>
-              <a:rPr lang="en-US" dirty="0" smtClean="0"/>
-              <a:t>There is no “suspend” on HDInsight clusters</a:t>
-            </a:r>
-          </a:p>
-          <a:p>
-            <a:pPr lvl="1"/>
-            <a:r>
-              <a:rPr lang="en-US" dirty="0" smtClean="0"/>
-              <a:t>You delete the cluster when finished</a:t>
-            </a:r>
-          </a:p>
-          <a:p>
-            <a:pPr lvl="1"/>
-            <a:r>
-              <a:rPr lang="en-US" dirty="0" smtClean="0"/>
-              <a:t>Does not delete your data as that’s in blob storage!</a:t>
+              <a:t>Hadoop and Spark on Linux</a:t>
             </a:r>
             <a:endParaRPr lang="en-US" dirty="0"/>
           </a:p>
@@ -14551,7 +14517,7 @@
     </p:spTree>
     <p:extLst>
       <p:ext uri="{BB962C8B-B14F-4D97-AF65-F5344CB8AC3E}">
-        <p14:creationId xmlns:p14="http://schemas.microsoft.com/office/powerpoint/2010/main" val="258416317"/>
+        <p14:creationId xmlns:p14="http://schemas.microsoft.com/office/powerpoint/2010/main" val="2309216998"/>
       </p:ext>
     </p:extLst>
   </p:cSld>
@@ -14561,13 +14527,6 @@
   <p:transition>
     <p:fade/>
   </p:transition>
-  <p:timing>
-    <p:tnLst>
-      <p:par>
-        <p:cTn id="1" dur="indefinite" restart="never" nodeType="tmRoot"/>
-      </p:par>
-    </p:tnLst>
-  </p:timing>
 </p:sld>
 </file>
 

</xml_diff>

<commit_message>
Added pictures and fixed typo
Closes #123
</commit_message>
<xml_diff>
--- a/Content/BigData/HDInsight and Big Data.pptx
+++ b/Content/BigData/HDInsight and Big Data.pptx
@@ -14,7 +14,7 @@
     <p:sldId id="262" r:id="rId5"/>
     <p:sldId id="259" r:id="rId6"/>
     <p:sldId id="264" r:id="rId7"/>
-    <p:sldId id="263" r:id="rId8"/>
+    <p:sldId id="268" r:id="rId8"/>
     <p:sldId id="266" r:id="rId9"/>
     <p:sldId id="267" r:id="rId10"/>
     <p:sldId id="265" r:id="rId11"/>
@@ -118,7 +118,18 @@
   </p:defaultTextStyle>
   <p:extLst>
     <p:ext uri="{EFAFB233-063F-42B5-8137-9DF3F51BA10A}">
-      <p15:sldGuideLst xmlns:p15="http://schemas.microsoft.com/office/powerpoint/2012/main"/>
+      <p15:sldGuideLst xmlns:p15="http://schemas.microsoft.com/office/powerpoint/2012/main">
+        <p15:guide id="1" orient="horz" pos="2160" userDrawn="1">
+          <p15:clr>
+            <a:srgbClr val="A4A3A4"/>
+          </p15:clr>
+        </p15:guide>
+        <p15:guide id="2" pos="3840" userDrawn="1">
+          <p15:clr>
+            <a:srgbClr val="A4A3A4"/>
+          </p15:clr>
+        </p15:guide>
+      </p15:sldGuideLst>
     </p:ext>
   </p:extLst>
 </p:presentation>
@@ -206,7 +217,7 @@
           <a:p>
             <a:fld id="{2E5CA586-3557-4985-BCD4-35EF5AC8B4A4}" type="datetimeFigureOut">
               <a:rPr lang="en-US" smtClean="0"/>
-              <a:t>10/9/15</a:t>
+              <a:t>10/11/15</a:t>
             </a:fld>
             <a:endParaRPr lang="en-US"/>
           </a:p>
@@ -472,6 +483,90 @@
     </a:lvl9pPr>
   </p:notesStyle>
 </p:notesMaster>
+</file>
+
+<file path=ppt/notesSlides/notesSlide1.xml><?xml version="1.0" encoding="utf-8"?>
+<p:notes xmlns:a="http://schemas.openxmlformats.org/drawingml/2006/main" xmlns:r="http://schemas.openxmlformats.org/officeDocument/2006/relationships" xmlns:p="http://schemas.openxmlformats.org/presentationml/2006/main">
+  <p:cSld>
+    <p:spTree>
+      <p:nvGrpSpPr>
+        <p:cNvPr id="1" name=""/>
+        <p:cNvGrpSpPr/>
+        <p:nvPr/>
+      </p:nvGrpSpPr>
+      <p:grpSpPr>
+        <a:xfrm>
+          <a:off x="0" y="0"/>
+          <a:ext cx="0" cy="0"/>
+          <a:chOff x="0" y="0"/>
+          <a:chExt cx="0" cy="0"/>
+        </a:xfrm>
+      </p:grpSpPr>
+      <p:sp>
+        <p:nvSpPr>
+          <p:cNvPr id="2" name="Slide Image Placeholder 1"/>
+          <p:cNvSpPr>
+            <a:spLocks noGrp="1" noRot="1" noChangeAspect="1"/>
+          </p:cNvSpPr>
+          <p:nvPr>
+            <p:ph type="sldImg"/>
+          </p:nvPr>
+        </p:nvSpPr>
+        <p:spPr/>
+      </p:sp>
+      <p:sp>
+        <p:nvSpPr>
+          <p:cNvPr id="3" name="Notes Placeholder 2"/>
+          <p:cNvSpPr>
+            <a:spLocks noGrp="1"/>
+          </p:cNvSpPr>
+          <p:nvPr>
+            <p:ph type="body" idx="1"/>
+          </p:nvPr>
+        </p:nvSpPr>
+        <p:spPr/>
+        <p:txBody>
+          <a:bodyPr/>
+          <a:lstStyle/>
+          <a:p>
+            <a:endParaRPr lang="en-US" dirty="0"/>
+          </a:p>
+        </p:txBody>
+      </p:sp>
+      <p:sp>
+        <p:nvSpPr>
+          <p:cNvPr id="4" name="Slide Number Placeholder 3"/>
+          <p:cNvSpPr>
+            <a:spLocks noGrp="1"/>
+          </p:cNvSpPr>
+          <p:nvPr>
+            <p:ph type="sldNum" sz="quarter" idx="10"/>
+          </p:nvPr>
+        </p:nvSpPr>
+        <p:spPr/>
+        <p:txBody>
+          <a:bodyPr/>
+          <a:lstStyle/>
+          <a:p>
+            <a:fld id="{BC60BE34-BC89-4C98-A56B-79B7A098D024}" type="slidenum">
+              <a:rPr lang="en-US" smtClean="0"/>
+              <a:t>7</a:t>
+            </a:fld>
+            <a:endParaRPr lang="en-US"/>
+          </a:p>
+        </p:txBody>
+      </p:sp>
+    </p:spTree>
+    <p:extLst>
+      <p:ext uri="{BB962C8B-B14F-4D97-AF65-F5344CB8AC3E}">
+        <p14:creationId xmlns:p14="http://schemas.microsoft.com/office/powerpoint/2010/main" val="114977607"/>
+      </p:ext>
+    </p:extLst>
+  </p:cSld>
+  <p:clrMapOvr>
+    <a:masterClrMapping/>
+  </p:clrMapOvr>
+</p:notes>
 </file>
 
 <file path=ppt/slideLayouts/slideLayout1.xml><?xml version="1.0" encoding="utf-8"?>
@@ -14020,229 +14115,2869 @@
           </a:p>
         </p:txBody>
       </p:sp>
-      <p:sp>
-        <p:nvSpPr>
-          <p:cNvPr id="4" name="Content Placeholder 3"/>
-          <p:cNvSpPr>
-            <a:spLocks noGrp="1"/>
-          </p:cNvSpPr>
-          <p:nvPr>
-            <p:ph sz="half" idx="2"/>
-          </p:nvPr>
-        </p:nvSpPr>
-        <p:spPr>
+      <p:grpSp>
+        <p:nvGrpSpPr>
+          <p:cNvPr id="38" name="Group 37"/>
+          <p:cNvGrpSpPr/>
+          <p:nvPr/>
+        </p:nvGrpSpPr>
+        <p:grpSpPr>
           <a:xfrm>
-            <a:off x="519249" y="1447800"/>
-            <a:ext cx="5486400" cy="4321183"/>
+            <a:off x="519249" y="2423067"/>
+            <a:ext cx="4268465" cy="738664"/>
+            <a:chOff x="509723" y="1994935"/>
+            <a:chExt cx="4268465" cy="738664"/>
           </a:xfrm>
-        </p:spPr>
-        <p:txBody>
-          <a:bodyPr/>
-          <a:lstStyle/>
-          <a:p>
-            <a:r>
-              <a:rPr lang="en-US" sz="2400" dirty="0" err="1" smtClean="0"/>
-              <a:t>Ambari</a:t>
-            </a:r>
-            <a:endParaRPr lang="en-US" sz="2400" dirty="0" smtClean="0"/>
-          </a:p>
-          <a:p>
-            <a:pPr lvl="1"/>
-            <a:r>
-              <a:rPr lang="en-US" sz="2400" dirty="0" smtClean="0"/>
-              <a:t>Cluster management</a:t>
-            </a:r>
-          </a:p>
-          <a:p>
-            <a:r>
-              <a:rPr lang="en-US" sz="2400" dirty="0" smtClean="0"/>
-              <a:t>Avro</a:t>
-            </a:r>
-          </a:p>
-          <a:p>
-            <a:pPr lvl="1"/>
-            <a:r>
-              <a:rPr lang="en-US" sz="2400" dirty="0" smtClean="0"/>
-              <a:t>Data serialization for .NET</a:t>
-            </a:r>
-          </a:p>
-          <a:p>
-            <a:r>
-              <a:rPr lang="en-US" sz="2400" dirty="0" smtClean="0"/>
-              <a:t>Hive &amp; </a:t>
-            </a:r>
-            <a:r>
-              <a:rPr lang="en-US" sz="2400" dirty="0" err="1" smtClean="0"/>
-              <a:t>HCatalog</a:t>
-            </a:r>
-            <a:endParaRPr lang="en-US" sz="2400" dirty="0" smtClean="0"/>
-          </a:p>
-          <a:p>
-            <a:pPr lvl="1"/>
-            <a:r>
-              <a:rPr lang="en-US" sz="2400" dirty="0" smtClean="0"/>
-              <a:t>SQL-like querying + management</a:t>
-            </a:r>
-          </a:p>
-          <a:p>
-            <a:r>
-              <a:rPr lang="en-US" sz="2400" dirty="0" smtClean="0"/>
-              <a:t>Mahout</a:t>
-            </a:r>
-          </a:p>
-          <a:p>
-            <a:pPr lvl="1"/>
-            <a:r>
-              <a:rPr lang="en-US" sz="2400" dirty="0" smtClean="0"/>
-              <a:t>Machine learning</a:t>
-            </a:r>
-          </a:p>
-          <a:p>
-            <a:r>
-              <a:rPr lang="en-US" sz="2400" dirty="0" err="1" smtClean="0"/>
-              <a:t>MapReduce</a:t>
-            </a:r>
-            <a:r>
-              <a:rPr lang="en-US" sz="2400" dirty="0" smtClean="0"/>
-              <a:t> &amp; YARN</a:t>
-            </a:r>
-          </a:p>
-          <a:p>
-            <a:pPr lvl="1"/>
-            <a:r>
-              <a:rPr lang="en-US" sz="2400" dirty="0" smtClean="0"/>
-              <a:t>Distributed processing + resource management</a:t>
-            </a:r>
-            <a:endParaRPr lang="en-US" sz="2400" dirty="0"/>
-          </a:p>
-        </p:txBody>
-      </p:sp>
-      <p:sp>
-        <p:nvSpPr>
-          <p:cNvPr id="9" name="Content Placeholder 3"/>
-          <p:cNvSpPr>
-            <a:spLocks noGrp="1"/>
-          </p:cNvSpPr>
-          <p:nvPr>
-            <p:ph sz="half" idx="2"/>
-          </p:nvPr>
-        </p:nvSpPr>
-        <p:spPr>
+        </p:grpSpPr>
+        <p:pic>
+          <p:nvPicPr>
+            <p:cNvPr id="7" name="Picture 6"/>
+            <p:cNvPicPr>
+              <a:picLocks noChangeAspect="1"/>
+            </p:cNvPicPr>
+            <p:nvPr/>
+          </p:nvPicPr>
+          <p:blipFill>
+            <a:blip r:embed="rId3"/>
+            <a:stretch>
+              <a:fillRect/>
+            </a:stretch>
+          </p:blipFill>
+          <p:spPr>
+            <a:xfrm>
+              <a:off x="509723" y="1994935"/>
+              <a:ext cx="958850" cy="301625"/>
+            </a:xfrm>
+            <a:prstGeom prst="rect">
+              <a:avLst/>
+            </a:prstGeom>
+          </p:spPr>
+        </p:pic>
+        <p:sp>
+          <p:nvSpPr>
+            <p:cNvPr id="8" name="Content Placeholder 5"/>
+            <p:cNvSpPr txBox="1">
+              <a:spLocks/>
+            </p:cNvSpPr>
+            <p:nvPr/>
+          </p:nvSpPr>
+          <p:spPr>
+            <a:xfrm>
+              <a:off x="1468573" y="1994935"/>
+              <a:ext cx="3309615" cy="738664"/>
+            </a:xfrm>
+            <a:prstGeom prst="rect">
+              <a:avLst/>
+            </a:prstGeom>
+          </p:spPr>
+          <p:txBody>
+            <a:bodyPr vert="horz" wrap="square" lIns="0" tIns="0" rIns="0" bIns="0" rtlCol="0">
+              <a:spAutoFit/>
+            </a:bodyPr>
+            <a:lstStyle>
+              <a:lvl1pPr marL="341211" indent="-341211" algn="l" defTabSz="914089" rtl="0" eaLnBrk="1" latinLnBrk="0" hangingPunct="1">
+                <a:lnSpc>
+                  <a:spcPct val="90000"/>
+                </a:lnSpc>
+                <a:spcBef>
+                  <a:spcPct val="20000"/>
+                </a:spcBef>
+                <a:buSzPct val="80000"/>
+                <a:buFont typeface="Arial" pitchFamily="34" charset="0"/>
+                <a:buChar char="•"/>
+                <a:defRPr sz="3199" kern="1200">
+                  <a:gradFill>
+                    <a:gsLst>
+                      <a:gs pos="0">
+                        <a:srgbClr val="595959"/>
+                      </a:gs>
+                      <a:gs pos="86000">
+                        <a:srgbClr val="595959"/>
+                      </a:gs>
+                    </a:gsLst>
+                    <a:lin ang="5400000" scaled="0"/>
+                  </a:gradFill>
+                  <a:latin typeface="+mn-lt"/>
+                  <a:ea typeface="+mn-ea"/>
+                  <a:cs typeface="+mn-cs"/>
+                </a:defRPr>
+              </a:lvl1pPr>
+              <a:lvl2pPr marL="626875" indent="-285664" algn="l" defTabSz="914089" rtl="0" eaLnBrk="1" latinLnBrk="0" hangingPunct="1">
+                <a:lnSpc>
+                  <a:spcPct val="90000"/>
+                </a:lnSpc>
+                <a:spcBef>
+                  <a:spcPct val="20000"/>
+                </a:spcBef>
+                <a:buSzPct val="80000"/>
+                <a:buFont typeface="Arial" pitchFamily="34" charset="0"/>
+                <a:buChar char="•"/>
+                <a:defRPr sz="2799" kern="1200">
+                  <a:gradFill>
+                    <a:gsLst>
+                      <a:gs pos="0">
+                        <a:srgbClr val="595959"/>
+                      </a:gs>
+                      <a:gs pos="86000">
+                        <a:srgbClr val="595959"/>
+                      </a:gs>
+                    </a:gsLst>
+                    <a:lin ang="5400000" scaled="0"/>
+                  </a:gradFill>
+                  <a:latin typeface="+mn-lt"/>
+                  <a:ea typeface="+mn-ea"/>
+                  <a:cs typeface="+mn-cs"/>
+                </a:defRPr>
+              </a:lvl2pPr>
+              <a:lvl3pPr marL="914126" indent="-287252" algn="l" defTabSz="914089" rtl="0" eaLnBrk="1" latinLnBrk="0" hangingPunct="1">
+                <a:lnSpc>
+                  <a:spcPct val="90000"/>
+                </a:lnSpc>
+                <a:spcBef>
+                  <a:spcPct val="20000"/>
+                </a:spcBef>
+                <a:buSzPct val="80000"/>
+                <a:buFont typeface="Arial" pitchFamily="34" charset="0"/>
+                <a:buChar char="•"/>
+                <a:defRPr sz="2399" kern="1200">
+                  <a:gradFill>
+                    <a:gsLst>
+                      <a:gs pos="0">
+                        <a:srgbClr val="595959"/>
+                      </a:gs>
+                      <a:gs pos="86000">
+                        <a:srgbClr val="595959"/>
+                      </a:gs>
+                    </a:gsLst>
+                    <a:lin ang="5400000" scaled="0"/>
+                  </a:gradFill>
+                  <a:latin typeface="+mn-lt"/>
+                  <a:ea typeface="+mn-ea"/>
+                  <a:cs typeface="+mn-cs"/>
+                </a:defRPr>
+              </a:lvl3pPr>
+              <a:lvl4pPr marL="1712399" indent="-225357" algn="l" defTabSz="914089" rtl="0" eaLnBrk="1" latinLnBrk="0" hangingPunct="1">
+                <a:lnSpc>
+                  <a:spcPct val="90000"/>
+                </a:lnSpc>
+                <a:spcBef>
+                  <a:spcPct val="20000"/>
+                </a:spcBef>
+                <a:buSzPct val="80000"/>
+                <a:buFont typeface="Arial" pitchFamily="34" charset="0"/>
+                <a:buChar char="•"/>
+                <a:defRPr sz="1999" kern="1200">
+                  <a:gradFill>
+                    <a:gsLst>
+                      <a:gs pos="0">
+                        <a:srgbClr val="595959"/>
+                      </a:gs>
+                      <a:gs pos="86000">
+                        <a:srgbClr val="595959"/>
+                      </a:gs>
+                    </a:gsLst>
+                    <a:lin ang="5400000" scaled="0"/>
+                  </a:gradFill>
+                  <a:latin typeface="+mn-lt"/>
+                  <a:ea typeface="+mn-ea"/>
+                  <a:cs typeface="+mn-cs"/>
+                </a:defRPr>
+              </a:lvl4pPr>
+              <a:lvl5pPr marL="1944105" indent="-231705" algn="l" defTabSz="914089" rtl="0" eaLnBrk="1" latinLnBrk="0" hangingPunct="1">
+                <a:lnSpc>
+                  <a:spcPct val="90000"/>
+                </a:lnSpc>
+                <a:spcBef>
+                  <a:spcPct val="20000"/>
+                </a:spcBef>
+                <a:buSzPct val="80000"/>
+                <a:buFont typeface="Arial" pitchFamily="34" charset="0"/>
+                <a:buChar char="•"/>
+                <a:defRPr sz="1999" kern="1200">
+                  <a:gradFill>
+                    <a:gsLst>
+                      <a:gs pos="0">
+                        <a:srgbClr val="595959"/>
+                      </a:gs>
+                      <a:gs pos="86000">
+                        <a:srgbClr val="595959"/>
+                      </a:gs>
+                    </a:gsLst>
+                    <a:lin ang="5400000" scaled="0"/>
+                  </a:gradFill>
+                  <a:latin typeface="+mn-lt"/>
+                  <a:ea typeface="+mn-ea"/>
+                  <a:cs typeface="+mn-cs"/>
+                </a:defRPr>
+              </a:lvl5pPr>
+              <a:lvl6pPr marL="2513745" indent="-228522" algn="l" defTabSz="914089" rtl="0" eaLnBrk="1" latinLnBrk="0" hangingPunct="1">
+                <a:spcBef>
+                  <a:spcPct val="20000"/>
+                </a:spcBef>
+                <a:buFont typeface="Arial" pitchFamily="34" charset="0"/>
+                <a:buChar char="•"/>
+                <a:defRPr sz="1799" kern="1200">
+                  <a:solidFill>
+                    <a:schemeClr val="tx1"/>
+                  </a:solidFill>
+                  <a:latin typeface="+mn-lt"/>
+                  <a:ea typeface="+mn-ea"/>
+                  <a:cs typeface="+mn-cs"/>
+                </a:defRPr>
+              </a:lvl6pPr>
+              <a:lvl7pPr marL="2970789" indent="-228522" algn="l" defTabSz="914089" rtl="0" eaLnBrk="1" latinLnBrk="0" hangingPunct="1">
+                <a:spcBef>
+                  <a:spcPct val="20000"/>
+                </a:spcBef>
+                <a:buFont typeface="Arial" pitchFamily="34" charset="0"/>
+                <a:buChar char="•"/>
+                <a:defRPr sz="1799" kern="1200">
+                  <a:solidFill>
+                    <a:schemeClr val="tx1"/>
+                  </a:solidFill>
+                  <a:latin typeface="+mn-lt"/>
+                  <a:ea typeface="+mn-ea"/>
+                  <a:cs typeface="+mn-cs"/>
+                </a:defRPr>
+              </a:lvl7pPr>
+              <a:lvl8pPr marL="3427834" indent="-228522" algn="l" defTabSz="914089" rtl="0" eaLnBrk="1" latinLnBrk="0" hangingPunct="1">
+                <a:spcBef>
+                  <a:spcPct val="20000"/>
+                </a:spcBef>
+                <a:buFont typeface="Arial" pitchFamily="34" charset="0"/>
+                <a:buChar char="•"/>
+                <a:defRPr sz="1799" kern="1200">
+                  <a:solidFill>
+                    <a:schemeClr val="tx1"/>
+                  </a:solidFill>
+                  <a:latin typeface="+mn-lt"/>
+                  <a:ea typeface="+mn-ea"/>
+                  <a:cs typeface="+mn-cs"/>
+                </a:defRPr>
+              </a:lvl8pPr>
+              <a:lvl9pPr marL="3884879" indent="-228522" algn="l" defTabSz="914089" rtl="0" eaLnBrk="1" latinLnBrk="0" hangingPunct="1">
+                <a:spcBef>
+                  <a:spcPct val="20000"/>
+                </a:spcBef>
+                <a:buFont typeface="Arial" pitchFamily="34" charset="0"/>
+                <a:buChar char="•"/>
+                <a:defRPr sz="1799" kern="1200">
+                  <a:solidFill>
+                    <a:schemeClr val="tx1"/>
+                  </a:solidFill>
+                  <a:latin typeface="+mn-lt"/>
+                  <a:ea typeface="+mn-ea"/>
+                  <a:cs typeface="+mn-cs"/>
+                </a:defRPr>
+              </a:lvl9pPr>
+            </a:lstStyle>
+            <a:p>
+              <a:pPr marL="0" indent="0">
+                <a:buFont typeface="Arial" pitchFamily="34" charset="0"/>
+                <a:buNone/>
+              </a:pPr>
+              <a:r>
+                <a:rPr lang="en-US" sz="2400" dirty="0" smtClean="0"/>
+                <a:t>Avro: Data Serialization</a:t>
+              </a:r>
+            </a:p>
+            <a:p>
+              <a:pPr marL="0" indent="0">
+                <a:buFont typeface="Arial" pitchFamily="34" charset="0"/>
+                <a:buNone/>
+              </a:pPr>
+              <a:endParaRPr lang="en-US" sz="2400" dirty="0"/>
+            </a:p>
+          </p:txBody>
+        </p:sp>
+      </p:grpSp>
+      <p:grpSp>
+        <p:nvGrpSpPr>
+          <p:cNvPr id="27" name="Group 26"/>
+          <p:cNvGrpSpPr/>
+          <p:nvPr/>
+        </p:nvGrpSpPr>
+        <p:grpSpPr>
           <a:xfrm>
-            <a:off x="6184766" y="1447800"/>
-            <a:ext cx="5486400" cy="4801314"/>
+            <a:off x="519249" y="3252624"/>
+            <a:ext cx="4936971" cy="1225816"/>
+            <a:chOff x="585288" y="2442546"/>
+            <a:chExt cx="4936971" cy="1225816"/>
           </a:xfrm>
-        </p:spPr>
-        <p:txBody>
-          <a:bodyPr/>
-          <a:lstStyle/>
-          <a:p>
-            <a:r>
-              <a:rPr lang="en-US" sz="2400" dirty="0" err="1" smtClean="0"/>
-              <a:t>Oozie</a:t>
-            </a:r>
-            <a:endParaRPr lang="en-US" sz="2400" dirty="0" smtClean="0"/>
-          </a:p>
-          <a:p>
-            <a:pPr lvl="1"/>
-            <a:r>
-              <a:rPr lang="en-US" sz="2400" dirty="0" smtClean="0"/>
-              <a:t>Workflow management</a:t>
-            </a:r>
-          </a:p>
-          <a:p>
-            <a:r>
-              <a:rPr lang="en-US" sz="2400" dirty="0" smtClean="0"/>
-              <a:t>Phoenix</a:t>
-            </a:r>
-          </a:p>
-          <a:p>
-            <a:pPr lvl="1"/>
-            <a:r>
-              <a:rPr lang="en-US" sz="2400" dirty="0" smtClean="0"/>
-              <a:t>Relation DB over </a:t>
-            </a:r>
-            <a:r>
-              <a:rPr lang="en-US" sz="2400" dirty="0" err="1" smtClean="0"/>
-              <a:t>HBase</a:t>
-            </a:r>
-            <a:endParaRPr lang="en-US" sz="2400" dirty="0" smtClean="0"/>
-          </a:p>
-          <a:p>
-            <a:r>
-              <a:rPr lang="en-US" sz="2400" dirty="0" smtClean="0"/>
-              <a:t>Pig</a:t>
-            </a:r>
-          </a:p>
-          <a:p>
-            <a:pPr lvl="1"/>
-            <a:r>
-              <a:rPr lang="en-US" sz="2400" dirty="0" smtClean="0"/>
-              <a:t>Simpler </a:t>
-            </a:r>
-            <a:r>
-              <a:rPr lang="en-US" sz="2400" dirty="0" err="1" smtClean="0"/>
-              <a:t>MapReduce</a:t>
-            </a:r>
-            <a:r>
-              <a:rPr lang="en-US" sz="2400" dirty="0" smtClean="0"/>
-              <a:t> transforms</a:t>
-            </a:r>
-          </a:p>
-          <a:p>
-            <a:r>
-              <a:rPr lang="en-US" sz="2400" dirty="0" err="1" smtClean="0"/>
-              <a:t>Sqoop</a:t>
-            </a:r>
-            <a:endParaRPr lang="en-US" sz="2400" dirty="0" smtClean="0"/>
-          </a:p>
-          <a:p>
-            <a:pPr lvl="1"/>
-            <a:r>
-              <a:rPr lang="en-US" sz="2400" dirty="0" smtClean="0"/>
-              <a:t>Data import/export</a:t>
-            </a:r>
-          </a:p>
-          <a:p>
-            <a:r>
-              <a:rPr lang="en-US" sz="2400" dirty="0" err="1" smtClean="0"/>
-              <a:t>Tez</a:t>
-            </a:r>
-            <a:endParaRPr lang="en-US" sz="2400" dirty="0" smtClean="0"/>
-          </a:p>
-          <a:p>
-            <a:pPr lvl="1"/>
-            <a:r>
-              <a:rPr lang="en-US" sz="2400" dirty="0" smtClean="0"/>
-              <a:t>Data-intensive </a:t>
-            </a:r>
-            <a:r>
-              <a:rPr lang="en-US" sz="2400" dirty="0" err="1" smtClean="0"/>
-              <a:t>effieciency</a:t>
-            </a:r>
-            <a:endParaRPr lang="en-US" sz="2400" dirty="0" smtClean="0"/>
-          </a:p>
-          <a:p>
-            <a:r>
-              <a:rPr lang="en-US" sz="2400" dirty="0" err="1" smtClean="0"/>
-              <a:t>ZooKeeper</a:t>
-            </a:r>
-            <a:endParaRPr lang="en-US" sz="2400" dirty="0" smtClean="0"/>
-          </a:p>
-          <a:p>
-            <a:pPr lvl="1"/>
-            <a:r>
-              <a:rPr lang="en-US" sz="2400" dirty="0" smtClean="0"/>
-              <a:t>Coordinator of distributed processes</a:t>
-            </a:r>
-            <a:endParaRPr lang="en-US" sz="2400" dirty="0"/>
-          </a:p>
-        </p:txBody>
-      </p:sp>
+        </p:grpSpPr>
+        <p:pic>
+          <p:nvPicPr>
+            <p:cNvPr id="9" name="Picture 8"/>
+            <p:cNvPicPr>
+              <a:picLocks noChangeAspect="1"/>
+            </p:cNvPicPr>
+            <p:nvPr/>
+          </p:nvPicPr>
+          <p:blipFill>
+            <a:blip r:embed="rId4"/>
+            <a:stretch>
+              <a:fillRect/>
+            </a:stretch>
+          </p:blipFill>
+          <p:spPr>
+            <a:xfrm>
+              <a:off x="585288" y="2442546"/>
+              <a:ext cx="403860" cy="411480"/>
+            </a:xfrm>
+            <a:prstGeom prst="rect">
+              <a:avLst/>
+            </a:prstGeom>
+          </p:spPr>
+        </p:pic>
+        <p:sp>
+          <p:nvSpPr>
+            <p:cNvPr id="10" name="Content Placeholder 5"/>
+            <p:cNvSpPr txBox="1">
+              <a:spLocks/>
+            </p:cNvSpPr>
+            <p:nvPr/>
+          </p:nvSpPr>
+          <p:spPr>
+            <a:xfrm>
+              <a:off x="1022168" y="2523433"/>
+              <a:ext cx="4500091" cy="1144929"/>
+            </a:xfrm>
+            <a:prstGeom prst="rect">
+              <a:avLst/>
+            </a:prstGeom>
+          </p:spPr>
+          <p:txBody>
+            <a:bodyPr vert="horz" wrap="square" lIns="0" tIns="0" rIns="0" bIns="0" rtlCol="0">
+              <a:spAutoFit/>
+            </a:bodyPr>
+            <a:lstStyle>
+              <a:lvl1pPr marL="341211" indent="-341211" algn="l" defTabSz="914089" rtl="0" eaLnBrk="1" latinLnBrk="0" hangingPunct="1">
+                <a:lnSpc>
+                  <a:spcPct val="90000"/>
+                </a:lnSpc>
+                <a:spcBef>
+                  <a:spcPct val="20000"/>
+                </a:spcBef>
+                <a:buSzPct val="80000"/>
+                <a:buFont typeface="Arial" pitchFamily="34" charset="0"/>
+                <a:buChar char="•"/>
+                <a:defRPr sz="3199" kern="1200">
+                  <a:gradFill>
+                    <a:gsLst>
+                      <a:gs pos="0">
+                        <a:srgbClr val="595959"/>
+                      </a:gs>
+                      <a:gs pos="86000">
+                        <a:srgbClr val="595959"/>
+                      </a:gs>
+                    </a:gsLst>
+                    <a:lin ang="5400000" scaled="0"/>
+                  </a:gradFill>
+                  <a:latin typeface="+mn-lt"/>
+                  <a:ea typeface="+mn-ea"/>
+                  <a:cs typeface="+mn-cs"/>
+                </a:defRPr>
+              </a:lvl1pPr>
+              <a:lvl2pPr marL="626875" indent="-285664" algn="l" defTabSz="914089" rtl="0" eaLnBrk="1" latinLnBrk="0" hangingPunct="1">
+                <a:lnSpc>
+                  <a:spcPct val="90000"/>
+                </a:lnSpc>
+                <a:spcBef>
+                  <a:spcPct val="20000"/>
+                </a:spcBef>
+                <a:buSzPct val="80000"/>
+                <a:buFont typeface="Arial" pitchFamily="34" charset="0"/>
+                <a:buChar char="•"/>
+                <a:defRPr sz="2799" kern="1200">
+                  <a:gradFill>
+                    <a:gsLst>
+                      <a:gs pos="0">
+                        <a:srgbClr val="595959"/>
+                      </a:gs>
+                      <a:gs pos="86000">
+                        <a:srgbClr val="595959"/>
+                      </a:gs>
+                    </a:gsLst>
+                    <a:lin ang="5400000" scaled="0"/>
+                  </a:gradFill>
+                  <a:latin typeface="+mn-lt"/>
+                  <a:ea typeface="+mn-ea"/>
+                  <a:cs typeface="+mn-cs"/>
+                </a:defRPr>
+              </a:lvl2pPr>
+              <a:lvl3pPr marL="914126" indent="-287252" algn="l" defTabSz="914089" rtl="0" eaLnBrk="1" latinLnBrk="0" hangingPunct="1">
+                <a:lnSpc>
+                  <a:spcPct val="90000"/>
+                </a:lnSpc>
+                <a:spcBef>
+                  <a:spcPct val="20000"/>
+                </a:spcBef>
+                <a:buSzPct val="80000"/>
+                <a:buFont typeface="Arial" pitchFamily="34" charset="0"/>
+                <a:buChar char="•"/>
+                <a:defRPr sz="2399" kern="1200">
+                  <a:gradFill>
+                    <a:gsLst>
+                      <a:gs pos="0">
+                        <a:srgbClr val="595959"/>
+                      </a:gs>
+                      <a:gs pos="86000">
+                        <a:srgbClr val="595959"/>
+                      </a:gs>
+                    </a:gsLst>
+                    <a:lin ang="5400000" scaled="0"/>
+                  </a:gradFill>
+                  <a:latin typeface="+mn-lt"/>
+                  <a:ea typeface="+mn-ea"/>
+                  <a:cs typeface="+mn-cs"/>
+                </a:defRPr>
+              </a:lvl3pPr>
+              <a:lvl4pPr marL="1712399" indent="-225357" algn="l" defTabSz="914089" rtl="0" eaLnBrk="1" latinLnBrk="0" hangingPunct="1">
+                <a:lnSpc>
+                  <a:spcPct val="90000"/>
+                </a:lnSpc>
+                <a:spcBef>
+                  <a:spcPct val="20000"/>
+                </a:spcBef>
+                <a:buSzPct val="80000"/>
+                <a:buFont typeface="Arial" pitchFamily="34" charset="0"/>
+                <a:buChar char="•"/>
+                <a:defRPr sz="1999" kern="1200">
+                  <a:gradFill>
+                    <a:gsLst>
+                      <a:gs pos="0">
+                        <a:srgbClr val="595959"/>
+                      </a:gs>
+                      <a:gs pos="86000">
+                        <a:srgbClr val="595959"/>
+                      </a:gs>
+                    </a:gsLst>
+                    <a:lin ang="5400000" scaled="0"/>
+                  </a:gradFill>
+                  <a:latin typeface="+mn-lt"/>
+                  <a:ea typeface="+mn-ea"/>
+                  <a:cs typeface="+mn-cs"/>
+                </a:defRPr>
+              </a:lvl4pPr>
+              <a:lvl5pPr marL="1944105" indent="-231705" algn="l" defTabSz="914089" rtl="0" eaLnBrk="1" latinLnBrk="0" hangingPunct="1">
+                <a:lnSpc>
+                  <a:spcPct val="90000"/>
+                </a:lnSpc>
+                <a:spcBef>
+                  <a:spcPct val="20000"/>
+                </a:spcBef>
+                <a:buSzPct val="80000"/>
+                <a:buFont typeface="Arial" pitchFamily="34" charset="0"/>
+                <a:buChar char="•"/>
+                <a:defRPr sz="1999" kern="1200">
+                  <a:gradFill>
+                    <a:gsLst>
+                      <a:gs pos="0">
+                        <a:srgbClr val="595959"/>
+                      </a:gs>
+                      <a:gs pos="86000">
+                        <a:srgbClr val="595959"/>
+                      </a:gs>
+                    </a:gsLst>
+                    <a:lin ang="5400000" scaled="0"/>
+                  </a:gradFill>
+                  <a:latin typeface="+mn-lt"/>
+                  <a:ea typeface="+mn-ea"/>
+                  <a:cs typeface="+mn-cs"/>
+                </a:defRPr>
+              </a:lvl5pPr>
+              <a:lvl6pPr marL="2513745" indent="-228522" algn="l" defTabSz="914089" rtl="0" eaLnBrk="1" latinLnBrk="0" hangingPunct="1">
+                <a:spcBef>
+                  <a:spcPct val="20000"/>
+                </a:spcBef>
+                <a:buFont typeface="Arial" pitchFamily="34" charset="0"/>
+                <a:buChar char="•"/>
+                <a:defRPr sz="1799" kern="1200">
+                  <a:solidFill>
+                    <a:schemeClr val="tx1"/>
+                  </a:solidFill>
+                  <a:latin typeface="+mn-lt"/>
+                  <a:ea typeface="+mn-ea"/>
+                  <a:cs typeface="+mn-cs"/>
+                </a:defRPr>
+              </a:lvl6pPr>
+              <a:lvl7pPr marL="2970789" indent="-228522" algn="l" defTabSz="914089" rtl="0" eaLnBrk="1" latinLnBrk="0" hangingPunct="1">
+                <a:spcBef>
+                  <a:spcPct val="20000"/>
+                </a:spcBef>
+                <a:buFont typeface="Arial" pitchFamily="34" charset="0"/>
+                <a:buChar char="•"/>
+                <a:defRPr sz="1799" kern="1200">
+                  <a:solidFill>
+                    <a:schemeClr val="tx1"/>
+                  </a:solidFill>
+                  <a:latin typeface="+mn-lt"/>
+                  <a:ea typeface="+mn-ea"/>
+                  <a:cs typeface="+mn-cs"/>
+                </a:defRPr>
+              </a:lvl7pPr>
+              <a:lvl8pPr marL="3427834" indent="-228522" algn="l" defTabSz="914089" rtl="0" eaLnBrk="1" latinLnBrk="0" hangingPunct="1">
+                <a:spcBef>
+                  <a:spcPct val="20000"/>
+                </a:spcBef>
+                <a:buFont typeface="Arial" pitchFamily="34" charset="0"/>
+                <a:buChar char="•"/>
+                <a:defRPr sz="1799" kern="1200">
+                  <a:solidFill>
+                    <a:schemeClr val="tx1"/>
+                  </a:solidFill>
+                  <a:latin typeface="+mn-lt"/>
+                  <a:ea typeface="+mn-ea"/>
+                  <a:cs typeface="+mn-cs"/>
+                </a:defRPr>
+              </a:lvl8pPr>
+              <a:lvl9pPr marL="3884879" indent="-228522" algn="l" defTabSz="914089" rtl="0" eaLnBrk="1" latinLnBrk="0" hangingPunct="1">
+                <a:spcBef>
+                  <a:spcPct val="20000"/>
+                </a:spcBef>
+                <a:buFont typeface="Arial" pitchFamily="34" charset="0"/>
+                <a:buChar char="•"/>
+                <a:defRPr sz="1799" kern="1200">
+                  <a:solidFill>
+                    <a:schemeClr val="tx1"/>
+                  </a:solidFill>
+                  <a:latin typeface="+mn-lt"/>
+                  <a:ea typeface="+mn-ea"/>
+                  <a:cs typeface="+mn-cs"/>
+                </a:defRPr>
+              </a:lvl9pPr>
+            </a:lstStyle>
+            <a:p>
+              <a:pPr marL="0" indent="0">
+                <a:buNone/>
+              </a:pPr>
+              <a:r>
+                <a:rPr lang="en-US" sz="2400" dirty="0"/>
+                <a:t>Hive &amp; </a:t>
+              </a:r>
+              <a:r>
+                <a:rPr lang="en-US" sz="2400" dirty="0" err="1" smtClean="0"/>
+                <a:t>Hcatalog</a:t>
+              </a:r>
+              <a:r>
+                <a:rPr lang="en-US" sz="2400" dirty="0" smtClean="0"/>
+                <a:t>: SQL-like queries</a:t>
+              </a:r>
+              <a:endParaRPr lang="en-US" sz="2400" dirty="0"/>
+            </a:p>
+            <a:p>
+              <a:pPr marL="0" indent="0">
+                <a:buFont typeface="Arial" pitchFamily="34" charset="0"/>
+                <a:buNone/>
+              </a:pPr>
+              <a:endParaRPr lang="en-US" sz="2400" dirty="0" smtClean="0"/>
+            </a:p>
+            <a:p>
+              <a:pPr marL="0" indent="0">
+                <a:buFont typeface="Arial" pitchFamily="34" charset="0"/>
+                <a:buNone/>
+              </a:pPr>
+              <a:endParaRPr lang="en-US" sz="2400" dirty="0"/>
+            </a:p>
+          </p:txBody>
+        </p:sp>
+      </p:grpSp>
+      <p:grpSp>
+        <p:nvGrpSpPr>
+          <p:cNvPr id="28" name="Group 27"/>
+          <p:cNvGrpSpPr/>
+          <p:nvPr/>
+        </p:nvGrpSpPr>
+        <p:grpSpPr>
+          <a:xfrm>
+            <a:off x="519249" y="4039970"/>
+            <a:ext cx="5657921" cy="1346330"/>
+            <a:chOff x="585288" y="2867384"/>
+            <a:chExt cx="5657921" cy="1346330"/>
+          </a:xfrm>
+        </p:grpSpPr>
+        <p:pic>
+          <p:nvPicPr>
+            <p:cNvPr id="12" name="Picture 11"/>
+            <p:cNvPicPr>
+              <a:picLocks noChangeAspect="1"/>
+            </p:cNvPicPr>
+            <p:nvPr/>
+          </p:nvPicPr>
+          <p:blipFill>
+            <a:blip r:embed="rId5"/>
+            <a:stretch>
+              <a:fillRect/>
+            </a:stretch>
+          </p:blipFill>
+          <p:spPr>
+            <a:xfrm>
+              <a:off x="585288" y="2867384"/>
+              <a:ext cx="1097915" cy="462280"/>
+            </a:xfrm>
+            <a:prstGeom prst="rect">
+              <a:avLst/>
+            </a:prstGeom>
+          </p:spPr>
+        </p:pic>
+        <p:sp>
+          <p:nvSpPr>
+            <p:cNvPr id="13" name="Content Placeholder 5"/>
+            <p:cNvSpPr txBox="1">
+              <a:spLocks/>
+            </p:cNvSpPr>
+            <p:nvPr/>
+          </p:nvSpPr>
+          <p:spPr>
+            <a:xfrm>
+              <a:off x="1743118" y="3068785"/>
+              <a:ext cx="4500091" cy="1144929"/>
+            </a:xfrm>
+            <a:prstGeom prst="rect">
+              <a:avLst/>
+            </a:prstGeom>
+          </p:spPr>
+          <p:txBody>
+            <a:bodyPr vert="horz" wrap="square" lIns="0" tIns="0" rIns="0" bIns="0" rtlCol="0">
+              <a:spAutoFit/>
+            </a:bodyPr>
+            <a:lstStyle>
+              <a:lvl1pPr marL="341211" indent="-341211" algn="l" defTabSz="914089" rtl="0" eaLnBrk="1" latinLnBrk="0" hangingPunct="1">
+                <a:lnSpc>
+                  <a:spcPct val="90000"/>
+                </a:lnSpc>
+                <a:spcBef>
+                  <a:spcPct val="20000"/>
+                </a:spcBef>
+                <a:buSzPct val="80000"/>
+                <a:buFont typeface="Arial" pitchFamily="34" charset="0"/>
+                <a:buChar char="•"/>
+                <a:defRPr sz="3199" kern="1200">
+                  <a:gradFill>
+                    <a:gsLst>
+                      <a:gs pos="0">
+                        <a:srgbClr val="595959"/>
+                      </a:gs>
+                      <a:gs pos="86000">
+                        <a:srgbClr val="595959"/>
+                      </a:gs>
+                    </a:gsLst>
+                    <a:lin ang="5400000" scaled="0"/>
+                  </a:gradFill>
+                  <a:latin typeface="+mn-lt"/>
+                  <a:ea typeface="+mn-ea"/>
+                  <a:cs typeface="+mn-cs"/>
+                </a:defRPr>
+              </a:lvl1pPr>
+              <a:lvl2pPr marL="626875" indent="-285664" algn="l" defTabSz="914089" rtl="0" eaLnBrk="1" latinLnBrk="0" hangingPunct="1">
+                <a:lnSpc>
+                  <a:spcPct val="90000"/>
+                </a:lnSpc>
+                <a:spcBef>
+                  <a:spcPct val="20000"/>
+                </a:spcBef>
+                <a:buSzPct val="80000"/>
+                <a:buFont typeface="Arial" pitchFamily="34" charset="0"/>
+                <a:buChar char="•"/>
+                <a:defRPr sz="2799" kern="1200">
+                  <a:gradFill>
+                    <a:gsLst>
+                      <a:gs pos="0">
+                        <a:srgbClr val="595959"/>
+                      </a:gs>
+                      <a:gs pos="86000">
+                        <a:srgbClr val="595959"/>
+                      </a:gs>
+                    </a:gsLst>
+                    <a:lin ang="5400000" scaled="0"/>
+                  </a:gradFill>
+                  <a:latin typeface="+mn-lt"/>
+                  <a:ea typeface="+mn-ea"/>
+                  <a:cs typeface="+mn-cs"/>
+                </a:defRPr>
+              </a:lvl2pPr>
+              <a:lvl3pPr marL="914126" indent="-287252" algn="l" defTabSz="914089" rtl="0" eaLnBrk="1" latinLnBrk="0" hangingPunct="1">
+                <a:lnSpc>
+                  <a:spcPct val="90000"/>
+                </a:lnSpc>
+                <a:spcBef>
+                  <a:spcPct val="20000"/>
+                </a:spcBef>
+                <a:buSzPct val="80000"/>
+                <a:buFont typeface="Arial" pitchFamily="34" charset="0"/>
+                <a:buChar char="•"/>
+                <a:defRPr sz="2399" kern="1200">
+                  <a:gradFill>
+                    <a:gsLst>
+                      <a:gs pos="0">
+                        <a:srgbClr val="595959"/>
+                      </a:gs>
+                      <a:gs pos="86000">
+                        <a:srgbClr val="595959"/>
+                      </a:gs>
+                    </a:gsLst>
+                    <a:lin ang="5400000" scaled="0"/>
+                  </a:gradFill>
+                  <a:latin typeface="+mn-lt"/>
+                  <a:ea typeface="+mn-ea"/>
+                  <a:cs typeface="+mn-cs"/>
+                </a:defRPr>
+              </a:lvl3pPr>
+              <a:lvl4pPr marL="1712399" indent="-225357" algn="l" defTabSz="914089" rtl="0" eaLnBrk="1" latinLnBrk="0" hangingPunct="1">
+                <a:lnSpc>
+                  <a:spcPct val="90000"/>
+                </a:lnSpc>
+                <a:spcBef>
+                  <a:spcPct val="20000"/>
+                </a:spcBef>
+                <a:buSzPct val="80000"/>
+                <a:buFont typeface="Arial" pitchFamily="34" charset="0"/>
+                <a:buChar char="•"/>
+                <a:defRPr sz="1999" kern="1200">
+                  <a:gradFill>
+                    <a:gsLst>
+                      <a:gs pos="0">
+                        <a:srgbClr val="595959"/>
+                      </a:gs>
+                      <a:gs pos="86000">
+                        <a:srgbClr val="595959"/>
+                      </a:gs>
+                    </a:gsLst>
+                    <a:lin ang="5400000" scaled="0"/>
+                  </a:gradFill>
+                  <a:latin typeface="+mn-lt"/>
+                  <a:ea typeface="+mn-ea"/>
+                  <a:cs typeface="+mn-cs"/>
+                </a:defRPr>
+              </a:lvl4pPr>
+              <a:lvl5pPr marL="1944105" indent="-231705" algn="l" defTabSz="914089" rtl="0" eaLnBrk="1" latinLnBrk="0" hangingPunct="1">
+                <a:lnSpc>
+                  <a:spcPct val="90000"/>
+                </a:lnSpc>
+                <a:spcBef>
+                  <a:spcPct val="20000"/>
+                </a:spcBef>
+                <a:buSzPct val="80000"/>
+                <a:buFont typeface="Arial" pitchFamily="34" charset="0"/>
+                <a:buChar char="•"/>
+                <a:defRPr sz="1999" kern="1200">
+                  <a:gradFill>
+                    <a:gsLst>
+                      <a:gs pos="0">
+                        <a:srgbClr val="595959"/>
+                      </a:gs>
+                      <a:gs pos="86000">
+                        <a:srgbClr val="595959"/>
+                      </a:gs>
+                    </a:gsLst>
+                    <a:lin ang="5400000" scaled="0"/>
+                  </a:gradFill>
+                  <a:latin typeface="+mn-lt"/>
+                  <a:ea typeface="+mn-ea"/>
+                  <a:cs typeface="+mn-cs"/>
+                </a:defRPr>
+              </a:lvl5pPr>
+              <a:lvl6pPr marL="2513745" indent="-228522" algn="l" defTabSz="914089" rtl="0" eaLnBrk="1" latinLnBrk="0" hangingPunct="1">
+                <a:spcBef>
+                  <a:spcPct val="20000"/>
+                </a:spcBef>
+                <a:buFont typeface="Arial" pitchFamily="34" charset="0"/>
+                <a:buChar char="•"/>
+                <a:defRPr sz="1799" kern="1200">
+                  <a:solidFill>
+                    <a:schemeClr val="tx1"/>
+                  </a:solidFill>
+                  <a:latin typeface="+mn-lt"/>
+                  <a:ea typeface="+mn-ea"/>
+                  <a:cs typeface="+mn-cs"/>
+                </a:defRPr>
+              </a:lvl6pPr>
+              <a:lvl7pPr marL="2970789" indent="-228522" algn="l" defTabSz="914089" rtl="0" eaLnBrk="1" latinLnBrk="0" hangingPunct="1">
+                <a:spcBef>
+                  <a:spcPct val="20000"/>
+                </a:spcBef>
+                <a:buFont typeface="Arial" pitchFamily="34" charset="0"/>
+                <a:buChar char="•"/>
+                <a:defRPr sz="1799" kern="1200">
+                  <a:solidFill>
+                    <a:schemeClr val="tx1"/>
+                  </a:solidFill>
+                  <a:latin typeface="+mn-lt"/>
+                  <a:ea typeface="+mn-ea"/>
+                  <a:cs typeface="+mn-cs"/>
+                </a:defRPr>
+              </a:lvl7pPr>
+              <a:lvl8pPr marL="3427834" indent="-228522" algn="l" defTabSz="914089" rtl="0" eaLnBrk="1" latinLnBrk="0" hangingPunct="1">
+                <a:spcBef>
+                  <a:spcPct val="20000"/>
+                </a:spcBef>
+                <a:buFont typeface="Arial" pitchFamily="34" charset="0"/>
+                <a:buChar char="•"/>
+                <a:defRPr sz="1799" kern="1200">
+                  <a:solidFill>
+                    <a:schemeClr val="tx1"/>
+                  </a:solidFill>
+                  <a:latin typeface="+mn-lt"/>
+                  <a:ea typeface="+mn-ea"/>
+                  <a:cs typeface="+mn-cs"/>
+                </a:defRPr>
+              </a:lvl8pPr>
+              <a:lvl9pPr marL="3884879" indent="-228522" algn="l" defTabSz="914089" rtl="0" eaLnBrk="1" latinLnBrk="0" hangingPunct="1">
+                <a:spcBef>
+                  <a:spcPct val="20000"/>
+                </a:spcBef>
+                <a:buFont typeface="Arial" pitchFamily="34" charset="0"/>
+                <a:buChar char="•"/>
+                <a:defRPr sz="1799" kern="1200">
+                  <a:solidFill>
+                    <a:schemeClr val="tx1"/>
+                  </a:solidFill>
+                  <a:latin typeface="+mn-lt"/>
+                  <a:ea typeface="+mn-ea"/>
+                  <a:cs typeface="+mn-cs"/>
+                </a:defRPr>
+              </a:lvl9pPr>
+            </a:lstStyle>
+            <a:p>
+              <a:pPr marL="0" indent="0">
+                <a:buNone/>
+              </a:pPr>
+              <a:r>
+                <a:rPr lang="en-US" sz="2400" dirty="0" smtClean="0"/>
+                <a:t>Mahout: Machine Learning</a:t>
+              </a:r>
+              <a:endParaRPr lang="en-US" sz="2400" dirty="0"/>
+            </a:p>
+            <a:p>
+              <a:pPr marL="0" indent="0">
+                <a:buFont typeface="Arial" pitchFamily="34" charset="0"/>
+                <a:buNone/>
+              </a:pPr>
+              <a:endParaRPr lang="en-US" sz="2400" dirty="0" smtClean="0"/>
+            </a:p>
+            <a:p>
+              <a:pPr marL="0" indent="0">
+                <a:buFont typeface="Arial" pitchFamily="34" charset="0"/>
+                <a:buNone/>
+              </a:pPr>
+              <a:endParaRPr lang="en-US" sz="2400" dirty="0"/>
+            </a:p>
+          </p:txBody>
+        </p:sp>
+      </p:grpSp>
+      <p:grpSp>
+        <p:nvGrpSpPr>
+          <p:cNvPr id="29" name="Group 28"/>
+          <p:cNvGrpSpPr/>
+          <p:nvPr/>
+        </p:nvGrpSpPr>
+        <p:grpSpPr>
+          <a:xfrm>
+            <a:off x="570809" y="5294056"/>
+            <a:ext cx="5657921" cy="1144929"/>
+            <a:chOff x="585288" y="3523102"/>
+            <a:chExt cx="5657921" cy="1144929"/>
+          </a:xfrm>
+        </p:grpSpPr>
+        <p:pic>
+          <p:nvPicPr>
+            <p:cNvPr id="14" name="Picture 13"/>
+            <p:cNvPicPr>
+              <a:picLocks noChangeAspect="1"/>
+            </p:cNvPicPr>
+            <p:nvPr/>
+          </p:nvPicPr>
+          <p:blipFill>
+            <a:blip r:embed="rId6"/>
+            <a:stretch>
+              <a:fillRect/>
+            </a:stretch>
+          </p:blipFill>
+          <p:spPr>
+            <a:xfrm>
+              <a:off x="585288" y="3555727"/>
+              <a:ext cx="1046480" cy="274320"/>
+            </a:xfrm>
+            <a:prstGeom prst="rect">
+              <a:avLst/>
+            </a:prstGeom>
+          </p:spPr>
+        </p:pic>
+        <p:sp>
+          <p:nvSpPr>
+            <p:cNvPr id="15" name="Content Placeholder 5"/>
+            <p:cNvSpPr txBox="1">
+              <a:spLocks/>
+            </p:cNvSpPr>
+            <p:nvPr/>
+          </p:nvSpPr>
+          <p:spPr>
+            <a:xfrm>
+              <a:off x="1743118" y="3523102"/>
+              <a:ext cx="4500091" cy="1144929"/>
+            </a:xfrm>
+            <a:prstGeom prst="rect">
+              <a:avLst/>
+            </a:prstGeom>
+          </p:spPr>
+          <p:txBody>
+            <a:bodyPr vert="horz" wrap="square" lIns="0" tIns="0" rIns="0" bIns="0" rtlCol="0">
+              <a:spAutoFit/>
+            </a:bodyPr>
+            <a:lstStyle>
+              <a:lvl1pPr marL="341211" indent="-341211" algn="l" defTabSz="914089" rtl="0" eaLnBrk="1" latinLnBrk="0" hangingPunct="1">
+                <a:lnSpc>
+                  <a:spcPct val="90000"/>
+                </a:lnSpc>
+                <a:spcBef>
+                  <a:spcPct val="20000"/>
+                </a:spcBef>
+                <a:buSzPct val="80000"/>
+                <a:buFont typeface="Arial" pitchFamily="34" charset="0"/>
+                <a:buChar char="•"/>
+                <a:defRPr sz="3199" kern="1200">
+                  <a:gradFill>
+                    <a:gsLst>
+                      <a:gs pos="0">
+                        <a:srgbClr val="595959"/>
+                      </a:gs>
+                      <a:gs pos="86000">
+                        <a:srgbClr val="595959"/>
+                      </a:gs>
+                    </a:gsLst>
+                    <a:lin ang="5400000" scaled="0"/>
+                  </a:gradFill>
+                  <a:latin typeface="+mn-lt"/>
+                  <a:ea typeface="+mn-ea"/>
+                  <a:cs typeface="+mn-cs"/>
+                </a:defRPr>
+              </a:lvl1pPr>
+              <a:lvl2pPr marL="626875" indent="-285664" algn="l" defTabSz="914089" rtl="0" eaLnBrk="1" latinLnBrk="0" hangingPunct="1">
+                <a:lnSpc>
+                  <a:spcPct val="90000"/>
+                </a:lnSpc>
+                <a:spcBef>
+                  <a:spcPct val="20000"/>
+                </a:spcBef>
+                <a:buSzPct val="80000"/>
+                <a:buFont typeface="Arial" pitchFamily="34" charset="0"/>
+                <a:buChar char="•"/>
+                <a:defRPr sz="2799" kern="1200">
+                  <a:gradFill>
+                    <a:gsLst>
+                      <a:gs pos="0">
+                        <a:srgbClr val="595959"/>
+                      </a:gs>
+                      <a:gs pos="86000">
+                        <a:srgbClr val="595959"/>
+                      </a:gs>
+                    </a:gsLst>
+                    <a:lin ang="5400000" scaled="0"/>
+                  </a:gradFill>
+                  <a:latin typeface="+mn-lt"/>
+                  <a:ea typeface="+mn-ea"/>
+                  <a:cs typeface="+mn-cs"/>
+                </a:defRPr>
+              </a:lvl2pPr>
+              <a:lvl3pPr marL="914126" indent="-287252" algn="l" defTabSz="914089" rtl="0" eaLnBrk="1" latinLnBrk="0" hangingPunct="1">
+                <a:lnSpc>
+                  <a:spcPct val="90000"/>
+                </a:lnSpc>
+                <a:spcBef>
+                  <a:spcPct val="20000"/>
+                </a:spcBef>
+                <a:buSzPct val="80000"/>
+                <a:buFont typeface="Arial" pitchFamily="34" charset="0"/>
+                <a:buChar char="•"/>
+                <a:defRPr sz="2399" kern="1200">
+                  <a:gradFill>
+                    <a:gsLst>
+                      <a:gs pos="0">
+                        <a:srgbClr val="595959"/>
+                      </a:gs>
+                      <a:gs pos="86000">
+                        <a:srgbClr val="595959"/>
+                      </a:gs>
+                    </a:gsLst>
+                    <a:lin ang="5400000" scaled="0"/>
+                  </a:gradFill>
+                  <a:latin typeface="+mn-lt"/>
+                  <a:ea typeface="+mn-ea"/>
+                  <a:cs typeface="+mn-cs"/>
+                </a:defRPr>
+              </a:lvl3pPr>
+              <a:lvl4pPr marL="1712399" indent="-225357" algn="l" defTabSz="914089" rtl="0" eaLnBrk="1" latinLnBrk="0" hangingPunct="1">
+                <a:lnSpc>
+                  <a:spcPct val="90000"/>
+                </a:lnSpc>
+                <a:spcBef>
+                  <a:spcPct val="20000"/>
+                </a:spcBef>
+                <a:buSzPct val="80000"/>
+                <a:buFont typeface="Arial" pitchFamily="34" charset="0"/>
+                <a:buChar char="•"/>
+                <a:defRPr sz="1999" kern="1200">
+                  <a:gradFill>
+                    <a:gsLst>
+                      <a:gs pos="0">
+                        <a:srgbClr val="595959"/>
+                      </a:gs>
+                      <a:gs pos="86000">
+                        <a:srgbClr val="595959"/>
+                      </a:gs>
+                    </a:gsLst>
+                    <a:lin ang="5400000" scaled="0"/>
+                  </a:gradFill>
+                  <a:latin typeface="+mn-lt"/>
+                  <a:ea typeface="+mn-ea"/>
+                  <a:cs typeface="+mn-cs"/>
+                </a:defRPr>
+              </a:lvl4pPr>
+              <a:lvl5pPr marL="1944105" indent="-231705" algn="l" defTabSz="914089" rtl="0" eaLnBrk="1" latinLnBrk="0" hangingPunct="1">
+                <a:lnSpc>
+                  <a:spcPct val="90000"/>
+                </a:lnSpc>
+                <a:spcBef>
+                  <a:spcPct val="20000"/>
+                </a:spcBef>
+                <a:buSzPct val="80000"/>
+                <a:buFont typeface="Arial" pitchFamily="34" charset="0"/>
+                <a:buChar char="•"/>
+                <a:defRPr sz="1999" kern="1200">
+                  <a:gradFill>
+                    <a:gsLst>
+                      <a:gs pos="0">
+                        <a:srgbClr val="595959"/>
+                      </a:gs>
+                      <a:gs pos="86000">
+                        <a:srgbClr val="595959"/>
+                      </a:gs>
+                    </a:gsLst>
+                    <a:lin ang="5400000" scaled="0"/>
+                  </a:gradFill>
+                  <a:latin typeface="+mn-lt"/>
+                  <a:ea typeface="+mn-ea"/>
+                  <a:cs typeface="+mn-cs"/>
+                </a:defRPr>
+              </a:lvl5pPr>
+              <a:lvl6pPr marL="2513745" indent="-228522" algn="l" defTabSz="914089" rtl="0" eaLnBrk="1" latinLnBrk="0" hangingPunct="1">
+                <a:spcBef>
+                  <a:spcPct val="20000"/>
+                </a:spcBef>
+                <a:buFont typeface="Arial" pitchFamily="34" charset="0"/>
+                <a:buChar char="•"/>
+                <a:defRPr sz="1799" kern="1200">
+                  <a:solidFill>
+                    <a:schemeClr val="tx1"/>
+                  </a:solidFill>
+                  <a:latin typeface="+mn-lt"/>
+                  <a:ea typeface="+mn-ea"/>
+                  <a:cs typeface="+mn-cs"/>
+                </a:defRPr>
+              </a:lvl6pPr>
+              <a:lvl7pPr marL="2970789" indent="-228522" algn="l" defTabSz="914089" rtl="0" eaLnBrk="1" latinLnBrk="0" hangingPunct="1">
+                <a:spcBef>
+                  <a:spcPct val="20000"/>
+                </a:spcBef>
+                <a:buFont typeface="Arial" pitchFamily="34" charset="0"/>
+                <a:buChar char="•"/>
+                <a:defRPr sz="1799" kern="1200">
+                  <a:solidFill>
+                    <a:schemeClr val="tx1"/>
+                  </a:solidFill>
+                  <a:latin typeface="+mn-lt"/>
+                  <a:ea typeface="+mn-ea"/>
+                  <a:cs typeface="+mn-cs"/>
+                </a:defRPr>
+              </a:lvl7pPr>
+              <a:lvl8pPr marL="3427834" indent="-228522" algn="l" defTabSz="914089" rtl="0" eaLnBrk="1" latinLnBrk="0" hangingPunct="1">
+                <a:spcBef>
+                  <a:spcPct val="20000"/>
+                </a:spcBef>
+                <a:buFont typeface="Arial" pitchFamily="34" charset="0"/>
+                <a:buChar char="•"/>
+                <a:defRPr sz="1799" kern="1200">
+                  <a:solidFill>
+                    <a:schemeClr val="tx1"/>
+                  </a:solidFill>
+                  <a:latin typeface="+mn-lt"/>
+                  <a:ea typeface="+mn-ea"/>
+                  <a:cs typeface="+mn-cs"/>
+                </a:defRPr>
+              </a:lvl8pPr>
+              <a:lvl9pPr marL="3884879" indent="-228522" algn="l" defTabSz="914089" rtl="0" eaLnBrk="1" latinLnBrk="0" hangingPunct="1">
+                <a:spcBef>
+                  <a:spcPct val="20000"/>
+                </a:spcBef>
+                <a:buFont typeface="Arial" pitchFamily="34" charset="0"/>
+                <a:buChar char="•"/>
+                <a:defRPr sz="1799" kern="1200">
+                  <a:solidFill>
+                    <a:schemeClr val="tx1"/>
+                  </a:solidFill>
+                  <a:latin typeface="+mn-lt"/>
+                  <a:ea typeface="+mn-ea"/>
+                  <a:cs typeface="+mn-cs"/>
+                </a:defRPr>
+              </a:lvl9pPr>
+            </a:lstStyle>
+            <a:p>
+              <a:pPr marL="0" indent="0">
+                <a:buNone/>
+              </a:pPr>
+              <a:r>
+                <a:rPr lang="en-US" sz="2400" dirty="0" err="1" smtClean="0"/>
+                <a:t>Oozie</a:t>
+              </a:r>
+              <a:r>
+                <a:rPr lang="en-US" sz="2400" dirty="0" smtClean="0"/>
+                <a:t>: Workflow Management</a:t>
+              </a:r>
+              <a:endParaRPr lang="en-US" sz="2400" dirty="0"/>
+            </a:p>
+            <a:p>
+              <a:pPr marL="0" indent="0">
+                <a:buFont typeface="Arial" pitchFamily="34" charset="0"/>
+                <a:buNone/>
+              </a:pPr>
+              <a:endParaRPr lang="en-US" sz="2400" dirty="0" smtClean="0"/>
+            </a:p>
+            <a:p>
+              <a:pPr marL="0" indent="0">
+                <a:buFont typeface="Arial" pitchFamily="34" charset="0"/>
+                <a:buNone/>
+              </a:pPr>
+              <a:endParaRPr lang="en-US" sz="2400" dirty="0"/>
+            </a:p>
+          </p:txBody>
+        </p:sp>
+      </p:grpSp>
+      <p:grpSp>
+        <p:nvGrpSpPr>
+          <p:cNvPr id="30" name="Group 29"/>
+          <p:cNvGrpSpPr/>
+          <p:nvPr/>
+        </p:nvGrpSpPr>
+        <p:grpSpPr>
+          <a:xfrm>
+            <a:off x="6096000" y="1436598"/>
+            <a:ext cx="5657920" cy="1155691"/>
+            <a:chOff x="585289" y="3985316"/>
+            <a:chExt cx="5657920" cy="1155691"/>
+          </a:xfrm>
+        </p:grpSpPr>
+        <p:pic>
+          <p:nvPicPr>
+            <p:cNvPr id="16" name="Picture 15"/>
+            <p:cNvPicPr>
+              <a:picLocks noChangeAspect="1"/>
+            </p:cNvPicPr>
+            <p:nvPr/>
+          </p:nvPicPr>
+          <p:blipFill>
+            <a:blip r:embed="rId7"/>
+            <a:stretch>
+              <a:fillRect/>
+            </a:stretch>
+          </p:blipFill>
+          <p:spPr>
+            <a:xfrm>
+              <a:off x="585289" y="3985316"/>
+              <a:ext cx="980694" cy="268224"/>
+            </a:xfrm>
+            <a:prstGeom prst="rect">
+              <a:avLst/>
+            </a:prstGeom>
+          </p:spPr>
+        </p:pic>
+        <p:sp>
+          <p:nvSpPr>
+            <p:cNvPr id="17" name="Content Placeholder 5"/>
+            <p:cNvSpPr txBox="1">
+              <a:spLocks/>
+            </p:cNvSpPr>
+            <p:nvPr/>
+          </p:nvSpPr>
+          <p:spPr>
+            <a:xfrm>
+              <a:off x="1743118" y="3996078"/>
+              <a:ext cx="4500091" cy="1144929"/>
+            </a:xfrm>
+            <a:prstGeom prst="rect">
+              <a:avLst/>
+            </a:prstGeom>
+          </p:spPr>
+          <p:txBody>
+            <a:bodyPr vert="horz" wrap="square" lIns="0" tIns="0" rIns="0" bIns="0" rtlCol="0">
+              <a:spAutoFit/>
+            </a:bodyPr>
+            <a:lstStyle>
+              <a:lvl1pPr marL="341211" indent="-341211" algn="l" defTabSz="914089" rtl="0" eaLnBrk="1" latinLnBrk="0" hangingPunct="1">
+                <a:lnSpc>
+                  <a:spcPct val="90000"/>
+                </a:lnSpc>
+                <a:spcBef>
+                  <a:spcPct val="20000"/>
+                </a:spcBef>
+                <a:buSzPct val="80000"/>
+                <a:buFont typeface="Arial" pitchFamily="34" charset="0"/>
+                <a:buChar char="•"/>
+                <a:defRPr sz="3199" kern="1200">
+                  <a:gradFill>
+                    <a:gsLst>
+                      <a:gs pos="0">
+                        <a:srgbClr val="595959"/>
+                      </a:gs>
+                      <a:gs pos="86000">
+                        <a:srgbClr val="595959"/>
+                      </a:gs>
+                    </a:gsLst>
+                    <a:lin ang="5400000" scaled="0"/>
+                  </a:gradFill>
+                  <a:latin typeface="+mn-lt"/>
+                  <a:ea typeface="+mn-ea"/>
+                  <a:cs typeface="+mn-cs"/>
+                </a:defRPr>
+              </a:lvl1pPr>
+              <a:lvl2pPr marL="626875" indent="-285664" algn="l" defTabSz="914089" rtl="0" eaLnBrk="1" latinLnBrk="0" hangingPunct="1">
+                <a:lnSpc>
+                  <a:spcPct val="90000"/>
+                </a:lnSpc>
+                <a:spcBef>
+                  <a:spcPct val="20000"/>
+                </a:spcBef>
+                <a:buSzPct val="80000"/>
+                <a:buFont typeface="Arial" pitchFamily="34" charset="0"/>
+                <a:buChar char="•"/>
+                <a:defRPr sz="2799" kern="1200">
+                  <a:gradFill>
+                    <a:gsLst>
+                      <a:gs pos="0">
+                        <a:srgbClr val="595959"/>
+                      </a:gs>
+                      <a:gs pos="86000">
+                        <a:srgbClr val="595959"/>
+                      </a:gs>
+                    </a:gsLst>
+                    <a:lin ang="5400000" scaled="0"/>
+                  </a:gradFill>
+                  <a:latin typeface="+mn-lt"/>
+                  <a:ea typeface="+mn-ea"/>
+                  <a:cs typeface="+mn-cs"/>
+                </a:defRPr>
+              </a:lvl2pPr>
+              <a:lvl3pPr marL="914126" indent="-287252" algn="l" defTabSz="914089" rtl="0" eaLnBrk="1" latinLnBrk="0" hangingPunct="1">
+                <a:lnSpc>
+                  <a:spcPct val="90000"/>
+                </a:lnSpc>
+                <a:spcBef>
+                  <a:spcPct val="20000"/>
+                </a:spcBef>
+                <a:buSzPct val="80000"/>
+                <a:buFont typeface="Arial" pitchFamily="34" charset="0"/>
+                <a:buChar char="•"/>
+                <a:defRPr sz="2399" kern="1200">
+                  <a:gradFill>
+                    <a:gsLst>
+                      <a:gs pos="0">
+                        <a:srgbClr val="595959"/>
+                      </a:gs>
+                      <a:gs pos="86000">
+                        <a:srgbClr val="595959"/>
+                      </a:gs>
+                    </a:gsLst>
+                    <a:lin ang="5400000" scaled="0"/>
+                  </a:gradFill>
+                  <a:latin typeface="+mn-lt"/>
+                  <a:ea typeface="+mn-ea"/>
+                  <a:cs typeface="+mn-cs"/>
+                </a:defRPr>
+              </a:lvl3pPr>
+              <a:lvl4pPr marL="1712399" indent="-225357" algn="l" defTabSz="914089" rtl="0" eaLnBrk="1" latinLnBrk="0" hangingPunct="1">
+                <a:lnSpc>
+                  <a:spcPct val="90000"/>
+                </a:lnSpc>
+                <a:spcBef>
+                  <a:spcPct val="20000"/>
+                </a:spcBef>
+                <a:buSzPct val="80000"/>
+                <a:buFont typeface="Arial" pitchFamily="34" charset="0"/>
+                <a:buChar char="•"/>
+                <a:defRPr sz="1999" kern="1200">
+                  <a:gradFill>
+                    <a:gsLst>
+                      <a:gs pos="0">
+                        <a:srgbClr val="595959"/>
+                      </a:gs>
+                      <a:gs pos="86000">
+                        <a:srgbClr val="595959"/>
+                      </a:gs>
+                    </a:gsLst>
+                    <a:lin ang="5400000" scaled="0"/>
+                  </a:gradFill>
+                  <a:latin typeface="+mn-lt"/>
+                  <a:ea typeface="+mn-ea"/>
+                  <a:cs typeface="+mn-cs"/>
+                </a:defRPr>
+              </a:lvl4pPr>
+              <a:lvl5pPr marL="1944105" indent="-231705" algn="l" defTabSz="914089" rtl="0" eaLnBrk="1" latinLnBrk="0" hangingPunct="1">
+                <a:lnSpc>
+                  <a:spcPct val="90000"/>
+                </a:lnSpc>
+                <a:spcBef>
+                  <a:spcPct val="20000"/>
+                </a:spcBef>
+                <a:buSzPct val="80000"/>
+                <a:buFont typeface="Arial" pitchFamily="34" charset="0"/>
+                <a:buChar char="•"/>
+                <a:defRPr sz="1999" kern="1200">
+                  <a:gradFill>
+                    <a:gsLst>
+                      <a:gs pos="0">
+                        <a:srgbClr val="595959"/>
+                      </a:gs>
+                      <a:gs pos="86000">
+                        <a:srgbClr val="595959"/>
+                      </a:gs>
+                    </a:gsLst>
+                    <a:lin ang="5400000" scaled="0"/>
+                  </a:gradFill>
+                  <a:latin typeface="+mn-lt"/>
+                  <a:ea typeface="+mn-ea"/>
+                  <a:cs typeface="+mn-cs"/>
+                </a:defRPr>
+              </a:lvl5pPr>
+              <a:lvl6pPr marL="2513745" indent="-228522" algn="l" defTabSz="914089" rtl="0" eaLnBrk="1" latinLnBrk="0" hangingPunct="1">
+                <a:spcBef>
+                  <a:spcPct val="20000"/>
+                </a:spcBef>
+                <a:buFont typeface="Arial" pitchFamily="34" charset="0"/>
+                <a:buChar char="•"/>
+                <a:defRPr sz="1799" kern="1200">
+                  <a:solidFill>
+                    <a:schemeClr val="tx1"/>
+                  </a:solidFill>
+                  <a:latin typeface="+mn-lt"/>
+                  <a:ea typeface="+mn-ea"/>
+                  <a:cs typeface="+mn-cs"/>
+                </a:defRPr>
+              </a:lvl6pPr>
+              <a:lvl7pPr marL="2970789" indent="-228522" algn="l" defTabSz="914089" rtl="0" eaLnBrk="1" latinLnBrk="0" hangingPunct="1">
+                <a:spcBef>
+                  <a:spcPct val="20000"/>
+                </a:spcBef>
+                <a:buFont typeface="Arial" pitchFamily="34" charset="0"/>
+                <a:buChar char="•"/>
+                <a:defRPr sz="1799" kern="1200">
+                  <a:solidFill>
+                    <a:schemeClr val="tx1"/>
+                  </a:solidFill>
+                  <a:latin typeface="+mn-lt"/>
+                  <a:ea typeface="+mn-ea"/>
+                  <a:cs typeface="+mn-cs"/>
+                </a:defRPr>
+              </a:lvl7pPr>
+              <a:lvl8pPr marL="3427834" indent="-228522" algn="l" defTabSz="914089" rtl="0" eaLnBrk="1" latinLnBrk="0" hangingPunct="1">
+                <a:spcBef>
+                  <a:spcPct val="20000"/>
+                </a:spcBef>
+                <a:buFont typeface="Arial" pitchFamily="34" charset="0"/>
+                <a:buChar char="•"/>
+                <a:defRPr sz="1799" kern="1200">
+                  <a:solidFill>
+                    <a:schemeClr val="tx1"/>
+                  </a:solidFill>
+                  <a:latin typeface="+mn-lt"/>
+                  <a:ea typeface="+mn-ea"/>
+                  <a:cs typeface="+mn-cs"/>
+                </a:defRPr>
+              </a:lvl8pPr>
+              <a:lvl9pPr marL="3884879" indent="-228522" algn="l" defTabSz="914089" rtl="0" eaLnBrk="1" latinLnBrk="0" hangingPunct="1">
+                <a:spcBef>
+                  <a:spcPct val="20000"/>
+                </a:spcBef>
+                <a:buFont typeface="Arial" pitchFamily="34" charset="0"/>
+                <a:buChar char="•"/>
+                <a:defRPr sz="1799" kern="1200">
+                  <a:solidFill>
+                    <a:schemeClr val="tx1"/>
+                  </a:solidFill>
+                  <a:latin typeface="+mn-lt"/>
+                  <a:ea typeface="+mn-ea"/>
+                  <a:cs typeface="+mn-cs"/>
+                </a:defRPr>
+              </a:lvl9pPr>
+            </a:lstStyle>
+            <a:p>
+              <a:pPr marL="0" indent="0">
+                <a:buNone/>
+              </a:pPr>
+              <a:r>
+                <a:rPr lang="en-US" sz="2400" dirty="0" smtClean="0"/>
+                <a:t>Phoenix: Relational DB over </a:t>
+              </a:r>
+              <a:r>
+                <a:rPr lang="en-US" sz="2400" dirty="0" err="1" smtClean="0"/>
+                <a:t>HBase</a:t>
+              </a:r>
+              <a:endParaRPr lang="en-US" sz="2400" dirty="0"/>
+            </a:p>
+            <a:p>
+              <a:pPr marL="0" indent="0">
+                <a:buFont typeface="Arial" pitchFamily="34" charset="0"/>
+                <a:buNone/>
+              </a:pPr>
+              <a:endParaRPr lang="en-US" sz="2400" dirty="0" smtClean="0"/>
+            </a:p>
+            <a:p>
+              <a:pPr marL="0" indent="0">
+                <a:buFont typeface="Arial" pitchFamily="34" charset="0"/>
+                <a:buNone/>
+              </a:pPr>
+              <a:endParaRPr lang="en-US" sz="2400" dirty="0"/>
+            </a:p>
+          </p:txBody>
+        </p:sp>
+      </p:grpSp>
+      <p:grpSp>
+        <p:nvGrpSpPr>
+          <p:cNvPr id="31" name="Group 30"/>
+          <p:cNvGrpSpPr/>
+          <p:nvPr/>
+        </p:nvGrpSpPr>
+        <p:grpSpPr>
+          <a:xfrm>
+            <a:off x="6096000" y="2188872"/>
+            <a:ext cx="5076820" cy="1333072"/>
+            <a:chOff x="512898" y="4408809"/>
+            <a:chExt cx="5076820" cy="1333072"/>
+          </a:xfrm>
+        </p:grpSpPr>
+        <p:pic>
+          <p:nvPicPr>
+            <p:cNvPr id="18" name="Picture 17"/>
+            <p:cNvPicPr>
+              <a:picLocks noChangeAspect="1"/>
+            </p:cNvPicPr>
+            <p:nvPr/>
+          </p:nvPicPr>
+          <p:blipFill>
+            <a:blip r:embed="rId8"/>
+            <a:stretch>
+              <a:fillRect/>
+            </a:stretch>
+          </p:blipFill>
+          <p:spPr>
+            <a:xfrm>
+              <a:off x="512898" y="4408809"/>
+              <a:ext cx="482600" cy="679450"/>
+            </a:xfrm>
+            <a:prstGeom prst="rect">
+              <a:avLst/>
+            </a:prstGeom>
+          </p:spPr>
+        </p:pic>
+        <p:sp>
+          <p:nvSpPr>
+            <p:cNvPr id="19" name="Content Placeholder 5"/>
+            <p:cNvSpPr txBox="1">
+              <a:spLocks/>
+            </p:cNvSpPr>
+            <p:nvPr/>
+          </p:nvSpPr>
+          <p:spPr>
+            <a:xfrm>
+              <a:off x="1089627" y="4596952"/>
+              <a:ext cx="4500091" cy="1144929"/>
+            </a:xfrm>
+            <a:prstGeom prst="rect">
+              <a:avLst/>
+            </a:prstGeom>
+          </p:spPr>
+          <p:txBody>
+            <a:bodyPr vert="horz" wrap="square" lIns="0" tIns="0" rIns="0" bIns="0" rtlCol="0">
+              <a:spAutoFit/>
+            </a:bodyPr>
+            <a:lstStyle>
+              <a:lvl1pPr marL="341211" indent="-341211" algn="l" defTabSz="914089" rtl="0" eaLnBrk="1" latinLnBrk="0" hangingPunct="1">
+                <a:lnSpc>
+                  <a:spcPct val="90000"/>
+                </a:lnSpc>
+                <a:spcBef>
+                  <a:spcPct val="20000"/>
+                </a:spcBef>
+                <a:buSzPct val="80000"/>
+                <a:buFont typeface="Arial" pitchFamily="34" charset="0"/>
+                <a:buChar char="•"/>
+                <a:defRPr sz="3199" kern="1200">
+                  <a:gradFill>
+                    <a:gsLst>
+                      <a:gs pos="0">
+                        <a:srgbClr val="595959"/>
+                      </a:gs>
+                      <a:gs pos="86000">
+                        <a:srgbClr val="595959"/>
+                      </a:gs>
+                    </a:gsLst>
+                    <a:lin ang="5400000" scaled="0"/>
+                  </a:gradFill>
+                  <a:latin typeface="+mn-lt"/>
+                  <a:ea typeface="+mn-ea"/>
+                  <a:cs typeface="+mn-cs"/>
+                </a:defRPr>
+              </a:lvl1pPr>
+              <a:lvl2pPr marL="626875" indent="-285664" algn="l" defTabSz="914089" rtl="0" eaLnBrk="1" latinLnBrk="0" hangingPunct="1">
+                <a:lnSpc>
+                  <a:spcPct val="90000"/>
+                </a:lnSpc>
+                <a:spcBef>
+                  <a:spcPct val="20000"/>
+                </a:spcBef>
+                <a:buSzPct val="80000"/>
+                <a:buFont typeface="Arial" pitchFamily="34" charset="0"/>
+                <a:buChar char="•"/>
+                <a:defRPr sz="2799" kern="1200">
+                  <a:gradFill>
+                    <a:gsLst>
+                      <a:gs pos="0">
+                        <a:srgbClr val="595959"/>
+                      </a:gs>
+                      <a:gs pos="86000">
+                        <a:srgbClr val="595959"/>
+                      </a:gs>
+                    </a:gsLst>
+                    <a:lin ang="5400000" scaled="0"/>
+                  </a:gradFill>
+                  <a:latin typeface="+mn-lt"/>
+                  <a:ea typeface="+mn-ea"/>
+                  <a:cs typeface="+mn-cs"/>
+                </a:defRPr>
+              </a:lvl2pPr>
+              <a:lvl3pPr marL="914126" indent="-287252" algn="l" defTabSz="914089" rtl="0" eaLnBrk="1" latinLnBrk="0" hangingPunct="1">
+                <a:lnSpc>
+                  <a:spcPct val="90000"/>
+                </a:lnSpc>
+                <a:spcBef>
+                  <a:spcPct val="20000"/>
+                </a:spcBef>
+                <a:buSzPct val="80000"/>
+                <a:buFont typeface="Arial" pitchFamily="34" charset="0"/>
+                <a:buChar char="•"/>
+                <a:defRPr sz="2399" kern="1200">
+                  <a:gradFill>
+                    <a:gsLst>
+                      <a:gs pos="0">
+                        <a:srgbClr val="595959"/>
+                      </a:gs>
+                      <a:gs pos="86000">
+                        <a:srgbClr val="595959"/>
+                      </a:gs>
+                    </a:gsLst>
+                    <a:lin ang="5400000" scaled="0"/>
+                  </a:gradFill>
+                  <a:latin typeface="+mn-lt"/>
+                  <a:ea typeface="+mn-ea"/>
+                  <a:cs typeface="+mn-cs"/>
+                </a:defRPr>
+              </a:lvl3pPr>
+              <a:lvl4pPr marL="1712399" indent="-225357" algn="l" defTabSz="914089" rtl="0" eaLnBrk="1" latinLnBrk="0" hangingPunct="1">
+                <a:lnSpc>
+                  <a:spcPct val="90000"/>
+                </a:lnSpc>
+                <a:spcBef>
+                  <a:spcPct val="20000"/>
+                </a:spcBef>
+                <a:buSzPct val="80000"/>
+                <a:buFont typeface="Arial" pitchFamily="34" charset="0"/>
+                <a:buChar char="•"/>
+                <a:defRPr sz="1999" kern="1200">
+                  <a:gradFill>
+                    <a:gsLst>
+                      <a:gs pos="0">
+                        <a:srgbClr val="595959"/>
+                      </a:gs>
+                      <a:gs pos="86000">
+                        <a:srgbClr val="595959"/>
+                      </a:gs>
+                    </a:gsLst>
+                    <a:lin ang="5400000" scaled="0"/>
+                  </a:gradFill>
+                  <a:latin typeface="+mn-lt"/>
+                  <a:ea typeface="+mn-ea"/>
+                  <a:cs typeface="+mn-cs"/>
+                </a:defRPr>
+              </a:lvl4pPr>
+              <a:lvl5pPr marL="1944105" indent="-231705" algn="l" defTabSz="914089" rtl="0" eaLnBrk="1" latinLnBrk="0" hangingPunct="1">
+                <a:lnSpc>
+                  <a:spcPct val="90000"/>
+                </a:lnSpc>
+                <a:spcBef>
+                  <a:spcPct val="20000"/>
+                </a:spcBef>
+                <a:buSzPct val="80000"/>
+                <a:buFont typeface="Arial" pitchFamily="34" charset="0"/>
+                <a:buChar char="•"/>
+                <a:defRPr sz="1999" kern="1200">
+                  <a:gradFill>
+                    <a:gsLst>
+                      <a:gs pos="0">
+                        <a:srgbClr val="595959"/>
+                      </a:gs>
+                      <a:gs pos="86000">
+                        <a:srgbClr val="595959"/>
+                      </a:gs>
+                    </a:gsLst>
+                    <a:lin ang="5400000" scaled="0"/>
+                  </a:gradFill>
+                  <a:latin typeface="+mn-lt"/>
+                  <a:ea typeface="+mn-ea"/>
+                  <a:cs typeface="+mn-cs"/>
+                </a:defRPr>
+              </a:lvl5pPr>
+              <a:lvl6pPr marL="2513745" indent="-228522" algn="l" defTabSz="914089" rtl="0" eaLnBrk="1" latinLnBrk="0" hangingPunct="1">
+                <a:spcBef>
+                  <a:spcPct val="20000"/>
+                </a:spcBef>
+                <a:buFont typeface="Arial" pitchFamily="34" charset="0"/>
+                <a:buChar char="•"/>
+                <a:defRPr sz="1799" kern="1200">
+                  <a:solidFill>
+                    <a:schemeClr val="tx1"/>
+                  </a:solidFill>
+                  <a:latin typeface="+mn-lt"/>
+                  <a:ea typeface="+mn-ea"/>
+                  <a:cs typeface="+mn-cs"/>
+                </a:defRPr>
+              </a:lvl6pPr>
+              <a:lvl7pPr marL="2970789" indent="-228522" algn="l" defTabSz="914089" rtl="0" eaLnBrk="1" latinLnBrk="0" hangingPunct="1">
+                <a:spcBef>
+                  <a:spcPct val="20000"/>
+                </a:spcBef>
+                <a:buFont typeface="Arial" pitchFamily="34" charset="0"/>
+                <a:buChar char="•"/>
+                <a:defRPr sz="1799" kern="1200">
+                  <a:solidFill>
+                    <a:schemeClr val="tx1"/>
+                  </a:solidFill>
+                  <a:latin typeface="+mn-lt"/>
+                  <a:ea typeface="+mn-ea"/>
+                  <a:cs typeface="+mn-cs"/>
+                </a:defRPr>
+              </a:lvl7pPr>
+              <a:lvl8pPr marL="3427834" indent="-228522" algn="l" defTabSz="914089" rtl="0" eaLnBrk="1" latinLnBrk="0" hangingPunct="1">
+                <a:spcBef>
+                  <a:spcPct val="20000"/>
+                </a:spcBef>
+                <a:buFont typeface="Arial" pitchFamily="34" charset="0"/>
+                <a:buChar char="•"/>
+                <a:defRPr sz="1799" kern="1200">
+                  <a:solidFill>
+                    <a:schemeClr val="tx1"/>
+                  </a:solidFill>
+                  <a:latin typeface="+mn-lt"/>
+                  <a:ea typeface="+mn-ea"/>
+                  <a:cs typeface="+mn-cs"/>
+                </a:defRPr>
+              </a:lvl8pPr>
+              <a:lvl9pPr marL="3884879" indent="-228522" algn="l" defTabSz="914089" rtl="0" eaLnBrk="1" latinLnBrk="0" hangingPunct="1">
+                <a:spcBef>
+                  <a:spcPct val="20000"/>
+                </a:spcBef>
+                <a:buFont typeface="Arial" pitchFamily="34" charset="0"/>
+                <a:buChar char="•"/>
+                <a:defRPr sz="1799" kern="1200">
+                  <a:solidFill>
+                    <a:schemeClr val="tx1"/>
+                  </a:solidFill>
+                  <a:latin typeface="+mn-lt"/>
+                  <a:ea typeface="+mn-ea"/>
+                  <a:cs typeface="+mn-cs"/>
+                </a:defRPr>
+              </a:lvl9pPr>
+            </a:lstStyle>
+            <a:p>
+              <a:pPr marL="0" indent="0">
+                <a:buNone/>
+              </a:pPr>
+              <a:r>
+                <a:rPr lang="en-US" sz="2400" dirty="0" smtClean="0"/>
+                <a:t>Pig: </a:t>
+              </a:r>
+              <a:r>
+                <a:rPr lang="en-US" sz="2400" dirty="0" err="1" smtClean="0"/>
+                <a:t>Easlier</a:t>
+              </a:r>
+              <a:r>
+                <a:rPr lang="en-US" sz="2400" dirty="0" smtClean="0"/>
+                <a:t> Map/Reduce</a:t>
+              </a:r>
+              <a:endParaRPr lang="en-US" sz="2400" dirty="0"/>
+            </a:p>
+            <a:p>
+              <a:pPr marL="0" indent="0">
+                <a:buFont typeface="Arial" pitchFamily="34" charset="0"/>
+                <a:buNone/>
+              </a:pPr>
+              <a:endParaRPr lang="en-US" sz="2400" dirty="0" smtClean="0"/>
+            </a:p>
+            <a:p>
+              <a:pPr marL="0" indent="0">
+                <a:buFont typeface="Arial" pitchFamily="34" charset="0"/>
+                <a:buNone/>
+              </a:pPr>
+              <a:endParaRPr lang="en-US" sz="2400" dirty="0"/>
+            </a:p>
+          </p:txBody>
+        </p:sp>
+      </p:grpSp>
+      <p:grpSp>
+        <p:nvGrpSpPr>
+          <p:cNvPr id="32" name="Group 31"/>
+          <p:cNvGrpSpPr/>
+          <p:nvPr/>
+        </p:nvGrpSpPr>
+        <p:grpSpPr>
+          <a:xfrm>
+            <a:off x="6095207" y="3348542"/>
+            <a:ext cx="5526191" cy="1144929"/>
+            <a:chOff x="638883" y="5188182"/>
+            <a:chExt cx="5526191" cy="1144929"/>
+          </a:xfrm>
+        </p:grpSpPr>
+        <p:pic>
+          <p:nvPicPr>
+            <p:cNvPr id="20" name="Picture 19"/>
+            <p:cNvPicPr>
+              <a:picLocks noChangeAspect="1"/>
+            </p:cNvPicPr>
+            <p:nvPr/>
+          </p:nvPicPr>
+          <p:blipFill>
+            <a:blip r:embed="rId9"/>
+            <a:stretch>
+              <a:fillRect/>
+            </a:stretch>
+          </p:blipFill>
+          <p:spPr>
+            <a:xfrm>
+              <a:off x="638883" y="5223145"/>
+              <a:ext cx="927100" cy="298450"/>
+            </a:xfrm>
+            <a:prstGeom prst="rect">
+              <a:avLst/>
+            </a:prstGeom>
+          </p:spPr>
+        </p:pic>
+        <p:sp>
+          <p:nvSpPr>
+            <p:cNvPr id="21" name="Content Placeholder 5"/>
+            <p:cNvSpPr txBox="1">
+              <a:spLocks/>
+            </p:cNvSpPr>
+            <p:nvPr/>
+          </p:nvSpPr>
+          <p:spPr>
+            <a:xfrm>
+              <a:off x="1664983" y="5188182"/>
+              <a:ext cx="4500091" cy="1144929"/>
+            </a:xfrm>
+            <a:prstGeom prst="rect">
+              <a:avLst/>
+            </a:prstGeom>
+          </p:spPr>
+          <p:txBody>
+            <a:bodyPr vert="horz" wrap="square" lIns="0" tIns="0" rIns="0" bIns="0" rtlCol="0">
+              <a:spAutoFit/>
+            </a:bodyPr>
+            <a:lstStyle>
+              <a:lvl1pPr marL="341211" indent="-341211" algn="l" defTabSz="914089" rtl="0" eaLnBrk="1" latinLnBrk="0" hangingPunct="1">
+                <a:lnSpc>
+                  <a:spcPct val="90000"/>
+                </a:lnSpc>
+                <a:spcBef>
+                  <a:spcPct val="20000"/>
+                </a:spcBef>
+                <a:buSzPct val="80000"/>
+                <a:buFont typeface="Arial" pitchFamily="34" charset="0"/>
+                <a:buChar char="•"/>
+                <a:defRPr sz="3199" kern="1200">
+                  <a:gradFill>
+                    <a:gsLst>
+                      <a:gs pos="0">
+                        <a:srgbClr val="595959"/>
+                      </a:gs>
+                      <a:gs pos="86000">
+                        <a:srgbClr val="595959"/>
+                      </a:gs>
+                    </a:gsLst>
+                    <a:lin ang="5400000" scaled="0"/>
+                  </a:gradFill>
+                  <a:latin typeface="+mn-lt"/>
+                  <a:ea typeface="+mn-ea"/>
+                  <a:cs typeface="+mn-cs"/>
+                </a:defRPr>
+              </a:lvl1pPr>
+              <a:lvl2pPr marL="626875" indent="-285664" algn="l" defTabSz="914089" rtl="0" eaLnBrk="1" latinLnBrk="0" hangingPunct="1">
+                <a:lnSpc>
+                  <a:spcPct val="90000"/>
+                </a:lnSpc>
+                <a:spcBef>
+                  <a:spcPct val="20000"/>
+                </a:spcBef>
+                <a:buSzPct val="80000"/>
+                <a:buFont typeface="Arial" pitchFamily="34" charset="0"/>
+                <a:buChar char="•"/>
+                <a:defRPr sz="2799" kern="1200">
+                  <a:gradFill>
+                    <a:gsLst>
+                      <a:gs pos="0">
+                        <a:srgbClr val="595959"/>
+                      </a:gs>
+                      <a:gs pos="86000">
+                        <a:srgbClr val="595959"/>
+                      </a:gs>
+                    </a:gsLst>
+                    <a:lin ang="5400000" scaled="0"/>
+                  </a:gradFill>
+                  <a:latin typeface="+mn-lt"/>
+                  <a:ea typeface="+mn-ea"/>
+                  <a:cs typeface="+mn-cs"/>
+                </a:defRPr>
+              </a:lvl2pPr>
+              <a:lvl3pPr marL="914126" indent="-287252" algn="l" defTabSz="914089" rtl="0" eaLnBrk="1" latinLnBrk="0" hangingPunct="1">
+                <a:lnSpc>
+                  <a:spcPct val="90000"/>
+                </a:lnSpc>
+                <a:spcBef>
+                  <a:spcPct val="20000"/>
+                </a:spcBef>
+                <a:buSzPct val="80000"/>
+                <a:buFont typeface="Arial" pitchFamily="34" charset="0"/>
+                <a:buChar char="•"/>
+                <a:defRPr sz="2399" kern="1200">
+                  <a:gradFill>
+                    <a:gsLst>
+                      <a:gs pos="0">
+                        <a:srgbClr val="595959"/>
+                      </a:gs>
+                      <a:gs pos="86000">
+                        <a:srgbClr val="595959"/>
+                      </a:gs>
+                    </a:gsLst>
+                    <a:lin ang="5400000" scaled="0"/>
+                  </a:gradFill>
+                  <a:latin typeface="+mn-lt"/>
+                  <a:ea typeface="+mn-ea"/>
+                  <a:cs typeface="+mn-cs"/>
+                </a:defRPr>
+              </a:lvl3pPr>
+              <a:lvl4pPr marL="1712399" indent="-225357" algn="l" defTabSz="914089" rtl="0" eaLnBrk="1" latinLnBrk="0" hangingPunct="1">
+                <a:lnSpc>
+                  <a:spcPct val="90000"/>
+                </a:lnSpc>
+                <a:spcBef>
+                  <a:spcPct val="20000"/>
+                </a:spcBef>
+                <a:buSzPct val="80000"/>
+                <a:buFont typeface="Arial" pitchFamily="34" charset="0"/>
+                <a:buChar char="•"/>
+                <a:defRPr sz="1999" kern="1200">
+                  <a:gradFill>
+                    <a:gsLst>
+                      <a:gs pos="0">
+                        <a:srgbClr val="595959"/>
+                      </a:gs>
+                      <a:gs pos="86000">
+                        <a:srgbClr val="595959"/>
+                      </a:gs>
+                    </a:gsLst>
+                    <a:lin ang="5400000" scaled="0"/>
+                  </a:gradFill>
+                  <a:latin typeface="+mn-lt"/>
+                  <a:ea typeface="+mn-ea"/>
+                  <a:cs typeface="+mn-cs"/>
+                </a:defRPr>
+              </a:lvl4pPr>
+              <a:lvl5pPr marL="1944105" indent="-231705" algn="l" defTabSz="914089" rtl="0" eaLnBrk="1" latinLnBrk="0" hangingPunct="1">
+                <a:lnSpc>
+                  <a:spcPct val="90000"/>
+                </a:lnSpc>
+                <a:spcBef>
+                  <a:spcPct val="20000"/>
+                </a:spcBef>
+                <a:buSzPct val="80000"/>
+                <a:buFont typeface="Arial" pitchFamily="34" charset="0"/>
+                <a:buChar char="•"/>
+                <a:defRPr sz="1999" kern="1200">
+                  <a:gradFill>
+                    <a:gsLst>
+                      <a:gs pos="0">
+                        <a:srgbClr val="595959"/>
+                      </a:gs>
+                      <a:gs pos="86000">
+                        <a:srgbClr val="595959"/>
+                      </a:gs>
+                    </a:gsLst>
+                    <a:lin ang="5400000" scaled="0"/>
+                  </a:gradFill>
+                  <a:latin typeface="+mn-lt"/>
+                  <a:ea typeface="+mn-ea"/>
+                  <a:cs typeface="+mn-cs"/>
+                </a:defRPr>
+              </a:lvl5pPr>
+              <a:lvl6pPr marL="2513745" indent="-228522" algn="l" defTabSz="914089" rtl="0" eaLnBrk="1" latinLnBrk="0" hangingPunct="1">
+                <a:spcBef>
+                  <a:spcPct val="20000"/>
+                </a:spcBef>
+                <a:buFont typeface="Arial" pitchFamily="34" charset="0"/>
+                <a:buChar char="•"/>
+                <a:defRPr sz="1799" kern="1200">
+                  <a:solidFill>
+                    <a:schemeClr val="tx1"/>
+                  </a:solidFill>
+                  <a:latin typeface="+mn-lt"/>
+                  <a:ea typeface="+mn-ea"/>
+                  <a:cs typeface="+mn-cs"/>
+                </a:defRPr>
+              </a:lvl6pPr>
+              <a:lvl7pPr marL="2970789" indent="-228522" algn="l" defTabSz="914089" rtl="0" eaLnBrk="1" latinLnBrk="0" hangingPunct="1">
+                <a:spcBef>
+                  <a:spcPct val="20000"/>
+                </a:spcBef>
+                <a:buFont typeface="Arial" pitchFamily="34" charset="0"/>
+                <a:buChar char="•"/>
+                <a:defRPr sz="1799" kern="1200">
+                  <a:solidFill>
+                    <a:schemeClr val="tx1"/>
+                  </a:solidFill>
+                  <a:latin typeface="+mn-lt"/>
+                  <a:ea typeface="+mn-ea"/>
+                  <a:cs typeface="+mn-cs"/>
+                </a:defRPr>
+              </a:lvl7pPr>
+              <a:lvl8pPr marL="3427834" indent="-228522" algn="l" defTabSz="914089" rtl="0" eaLnBrk="1" latinLnBrk="0" hangingPunct="1">
+                <a:spcBef>
+                  <a:spcPct val="20000"/>
+                </a:spcBef>
+                <a:buFont typeface="Arial" pitchFamily="34" charset="0"/>
+                <a:buChar char="•"/>
+                <a:defRPr sz="1799" kern="1200">
+                  <a:solidFill>
+                    <a:schemeClr val="tx1"/>
+                  </a:solidFill>
+                  <a:latin typeface="+mn-lt"/>
+                  <a:ea typeface="+mn-ea"/>
+                  <a:cs typeface="+mn-cs"/>
+                </a:defRPr>
+              </a:lvl8pPr>
+              <a:lvl9pPr marL="3884879" indent="-228522" algn="l" defTabSz="914089" rtl="0" eaLnBrk="1" latinLnBrk="0" hangingPunct="1">
+                <a:spcBef>
+                  <a:spcPct val="20000"/>
+                </a:spcBef>
+                <a:buFont typeface="Arial" pitchFamily="34" charset="0"/>
+                <a:buChar char="•"/>
+                <a:defRPr sz="1799" kern="1200">
+                  <a:solidFill>
+                    <a:schemeClr val="tx1"/>
+                  </a:solidFill>
+                  <a:latin typeface="+mn-lt"/>
+                  <a:ea typeface="+mn-ea"/>
+                  <a:cs typeface="+mn-cs"/>
+                </a:defRPr>
+              </a:lvl9pPr>
+            </a:lstStyle>
+            <a:p>
+              <a:pPr marL="0" indent="0">
+                <a:buNone/>
+              </a:pPr>
+              <a:r>
+                <a:rPr lang="en-US" sz="2400" dirty="0" err="1" smtClean="0"/>
+                <a:t>Sqoop</a:t>
+              </a:r>
+              <a:r>
+                <a:rPr lang="en-US" sz="2400" dirty="0" smtClean="0"/>
+                <a:t>: Data Import-Export</a:t>
+              </a:r>
+              <a:endParaRPr lang="en-US" sz="2400" dirty="0"/>
+            </a:p>
+            <a:p>
+              <a:pPr marL="0" indent="0">
+                <a:buFont typeface="Arial" pitchFamily="34" charset="0"/>
+                <a:buNone/>
+              </a:pPr>
+              <a:endParaRPr lang="en-US" sz="2400" dirty="0" smtClean="0"/>
+            </a:p>
+            <a:p>
+              <a:pPr marL="0" indent="0">
+                <a:buFont typeface="Arial" pitchFamily="34" charset="0"/>
+                <a:buNone/>
+              </a:pPr>
+              <a:endParaRPr lang="en-US" sz="2400" dirty="0"/>
+            </a:p>
+          </p:txBody>
+        </p:sp>
+      </p:grpSp>
+      <p:grpSp>
+        <p:nvGrpSpPr>
+          <p:cNvPr id="33" name="Group 32"/>
+          <p:cNvGrpSpPr/>
+          <p:nvPr/>
+        </p:nvGrpSpPr>
+        <p:grpSpPr>
+          <a:xfrm>
+            <a:off x="6106672" y="4194137"/>
+            <a:ext cx="5468241" cy="1191061"/>
+            <a:chOff x="597833" y="5610349"/>
+            <a:chExt cx="5468241" cy="1191061"/>
+          </a:xfrm>
+        </p:grpSpPr>
+        <p:pic>
+          <p:nvPicPr>
+            <p:cNvPr id="22" name="Picture 21"/>
+            <p:cNvPicPr>
+              <a:picLocks noChangeAspect="1"/>
+            </p:cNvPicPr>
+            <p:nvPr/>
+          </p:nvPicPr>
+          <p:blipFill>
+            <a:blip r:embed="rId10"/>
+            <a:stretch>
+              <a:fillRect/>
+            </a:stretch>
+          </p:blipFill>
+          <p:spPr>
+            <a:xfrm>
+              <a:off x="597833" y="5610349"/>
+              <a:ext cx="901700" cy="425450"/>
+            </a:xfrm>
+            <a:prstGeom prst="rect">
+              <a:avLst/>
+            </a:prstGeom>
+          </p:spPr>
+        </p:pic>
+        <p:sp>
+          <p:nvSpPr>
+            <p:cNvPr id="23" name="Content Placeholder 5"/>
+            <p:cNvSpPr txBox="1">
+              <a:spLocks/>
+            </p:cNvSpPr>
+            <p:nvPr/>
+          </p:nvSpPr>
+          <p:spPr>
+            <a:xfrm>
+              <a:off x="1565983" y="5656481"/>
+              <a:ext cx="4500091" cy="1144929"/>
+            </a:xfrm>
+            <a:prstGeom prst="rect">
+              <a:avLst/>
+            </a:prstGeom>
+          </p:spPr>
+          <p:txBody>
+            <a:bodyPr vert="horz" wrap="square" lIns="0" tIns="0" rIns="0" bIns="0" rtlCol="0">
+              <a:spAutoFit/>
+            </a:bodyPr>
+            <a:lstStyle>
+              <a:lvl1pPr marL="341211" indent="-341211" algn="l" defTabSz="914089" rtl="0" eaLnBrk="1" latinLnBrk="0" hangingPunct="1">
+                <a:lnSpc>
+                  <a:spcPct val="90000"/>
+                </a:lnSpc>
+                <a:spcBef>
+                  <a:spcPct val="20000"/>
+                </a:spcBef>
+                <a:buSzPct val="80000"/>
+                <a:buFont typeface="Arial" pitchFamily="34" charset="0"/>
+                <a:buChar char="•"/>
+                <a:defRPr sz="3199" kern="1200">
+                  <a:gradFill>
+                    <a:gsLst>
+                      <a:gs pos="0">
+                        <a:srgbClr val="595959"/>
+                      </a:gs>
+                      <a:gs pos="86000">
+                        <a:srgbClr val="595959"/>
+                      </a:gs>
+                    </a:gsLst>
+                    <a:lin ang="5400000" scaled="0"/>
+                  </a:gradFill>
+                  <a:latin typeface="+mn-lt"/>
+                  <a:ea typeface="+mn-ea"/>
+                  <a:cs typeface="+mn-cs"/>
+                </a:defRPr>
+              </a:lvl1pPr>
+              <a:lvl2pPr marL="626875" indent="-285664" algn="l" defTabSz="914089" rtl="0" eaLnBrk="1" latinLnBrk="0" hangingPunct="1">
+                <a:lnSpc>
+                  <a:spcPct val="90000"/>
+                </a:lnSpc>
+                <a:spcBef>
+                  <a:spcPct val="20000"/>
+                </a:spcBef>
+                <a:buSzPct val="80000"/>
+                <a:buFont typeface="Arial" pitchFamily="34" charset="0"/>
+                <a:buChar char="•"/>
+                <a:defRPr sz="2799" kern="1200">
+                  <a:gradFill>
+                    <a:gsLst>
+                      <a:gs pos="0">
+                        <a:srgbClr val="595959"/>
+                      </a:gs>
+                      <a:gs pos="86000">
+                        <a:srgbClr val="595959"/>
+                      </a:gs>
+                    </a:gsLst>
+                    <a:lin ang="5400000" scaled="0"/>
+                  </a:gradFill>
+                  <a:latin typeface="+mn-lt"/>
+                  <a:ea typeface="+mn-ea"/>
+                  <a:cs typeface="+mn-cs"/>
+                </a:defRPr>
+              </a:lvl2pPr>
+              <a:lvl3pPr marL="914126" indent="-287252" algn="l" defTabSz="914089" rtl="0" eaLnBrk="1" latinLnBrk="0" hangingPunct="1">
+                <a:lnSpc>
+                  <a:spcPct val="90000"/>
+                </a:lnSpc>
+                <a:spcBef>
+                  <a:spcPct val="20000"/>
+                </a:spcBef>
+                <a:buSzPct val="80000"/>
+                <a:buFont typeface="Arial" pitchFamily="34" charset="0"/>
+                <a:buChar char="•"/>
+                <a:defRPr sz="2399" kern="1200">
+                  <a:gradFill>
+                    <a:gsLst>
+                      <a:gs pos="0">
+                        <a:srgbClr val="595959"/>
+                      </a:gs>
+                      <a:gs pos="86000">
+                        <a:srgbClr val="595959"/>
+                      </a:gs>
+                    </a:gsLst>
+                    <a:lin ang="5400000" scaled="0"/>
+                  </a:gradFill>
+                  <a:latin typeface="+mn-lt"/>
+                  <a:ea typeface="+mn-ea"/>
+                  <a:cs typeface="+mn-cs"/>
+                </a:defRPr>
+              </a:lvl3pPr>
+              <a:lvl4pPr marL="1712399" indent="-225357" algn="l" defTabSz="914089" rtl="0" eaLnBrk="1" latinLnBrk="0" hangingPunct="1">
+                <a:lnSpc>
+                  <a:spcPct val="90000"/>
+                </a:lnSpc>
+                <a:spcBef>
+                  <a:spcPct val="20000"/>
+                </a:spcBef>
+                <a:buSzPct val="80000"/>
+                <a:buFont typeface="Arial" pitchFamily="34" charset="0"/>
+                <a:buChar char="•"/>
+                <a:defRPr sz="1999" kern="1200">
+                  <a:gradFill>
+                    <a:gsLst>
+                      <a:gs pos="0">
+                        <a:srgbClr val="595959"/>
+                      </a:gs>
+                      <a:gs pos="86000">
+                        <a:srgbClr val="595959"/>
+                      </a:gs>
+                    </a:gsLst>
+                    <a:lin ang="5400000" scaled="0"/>
+                  </a:gradFill>
+                  <a:latin typeface="+mn-lt"/>
+                  <a:ea typeface="+mn-ea"/>
+                  <a:cs typeface="+mn-cs"/>
+                </a:defRPr>
+              </a:lvl4pPr>
+              <a:lvl5pPr marL="1944105" indent="-231705" algn="l" defTabSz="914089" rtl="0" eaLnBrk="1" latinLnBrk="0" hangingPunct="1">
+                <a:lnSpc>
+                  <a:spcPct val="90000"/>
+                </a:lnSpc>
+                <a:spcBef>
+                  <a:spcPct val="20000"/>
+                </a:spcBef>
+                <a:buSzPct val="80000"/>
+                <a:buFont typeface="Arial" pitchFamily="34" charset="0"/>
+                <a:buChar char="•"/>
+                <a:defRPr sz="1999" kern="1200">
+                  <a:gradFill>
+                    <a:gsLst>
+                      <a:gs pos="0">
+                        <a:srgbClr val="595959"/>
+                      </a:gs>
+                      <a:gs pos="86000">
+                        <a:srgbClr val="595959"/>
+                      </a:gs>
+                    </a:gsLst>
+                    <a:lin ang="5400000" scaled="0"/>
+                  </a:gradFill>
+                  <a:latin typeface="+mn-lt"/>
+                  <a:ea typeface="+mn-ea"/>
+                  <a:cs typeface="+mn-cs"/>
+                </a:defRPr>
+              </a:lvl5pPr>
+              <a:lvl6pPr marL="2513745" indent="-228522" algn="l" defTabSz="914089" rtl="0" eaLnBrk="1" latinLnBrk="0" hangingPunct="1">
+                <a:spcBef>
+                  <a:spcPct val="20000"/>
+                </a:spcBef>
+                <a:buFont typeface="Arial" pitchFamily="34" charset="0"/>
+                <a:buChar char="•"/>
+                <a:defRPr sz="1799" kern="1200">
+                  <a:solidFill>
+                    <a:schemeClr val="tx1"/>
+                  </a:solidFill>
+                  <a:latin typeface="+mn-lt"/>
+                  <a:ea typeface="+mn-ea"/>
+                  <a:cs typeface="+mn-cs"/>
+                </a:defRPr>
+              </a:lvl6pPr>
+              <a:lvl7pPr marL="2970789" indent="-228522" algn="l" defTabSz="914089" rtl="0" eaLnBrk="1" latinLnBrk="0" hangingPunct="1">
+                <a:spcBef>
+                  <a:spcPct val="20000"/>
+                </a:spcBef>
+                <a:buFont typeface="Arial" pitchFamily="34" charset="0"/>
+                <a:buChar char="•"/>
+                <a:defRPr sz="1799" kern="1200">
+                  <a:solidFill>
+                    <a:schemeClr val="tx1"/>
+                  </a:solidFill>
+                  <a:latin typeface="+mn-lt"/>
+                  <a:ea typeface="+mn-ea"/>
+                  <a:cs typeface="+mn-cs"/>
+                </a:defRPr>
+              </a:lvl7pPr>
+              <a:lvl8pPr marL="3427834" indent="-228522" algn="l" defTabSz="914089" rtl="0" eaLnBrk="1" latinLnBrk="0" hangingPunct="1">
+                <a:spcBef>
+                  <a:spcPct val="20000"/>
+                </a:spcBef>
+                <a:buFont typeface="Arial" pitchFamily="34" charset="0"/>
+                <a:buChar char="•"/>
+                <a:defRPr sz="1799" kern="1200">
+                  <a:solidFill>
+                    <a:schemeClr val="tx1"/>
+                  </a:solidFill>
+                  <a:latin typeface="+mn-lt"/>
+                  <a:ea typeface="+mn-ea"/>
+                  <a:cs typeface="+mn-cs"/>
+                </a:defRPr>
+              </a:lvl8pPr>
+              <a:lvl9pPr marL="3884879" indent="-228522" algn="l" defTabSz="914089" rtl="0" eaLnBrk="1" latinLnBrk="0" hangingPunct="1">
+                <a:spcBef>
+                  <a:spcPct val="20000"/>
+                </a:spcBef>
+                <a:buFont typeface="Arial" pitchFamily="34" charset="0"/>
+                <a:buChar char="•"/>
+                <a:defRPr sz="1799" kern="1200">
+                  <a:solidFill>
+                    <a:schemeClr val="tx1"/>
+                  </a:solidFill>
+                  <a:latin typeface="+mn-lt"/>
+                  <a:ea typeface="+mn-ea"/>
+                  <a:cs typeface="+mn-cs"/>
+                </a:defRPr>
+              </a:lvl9pPr>
+            </a:lstStyle>
+            <a:p>
+              <a:pPr marL="0" indent="0">
+                <a:buNone/>
+              </a:pPr>
+              <a:r>
+                <a:rPr lang="en-US" sz="2400" dirty="0" err="1" smtClean="0"/>
+                <a:t>Tez</a:t>
+              </a:r>
+              <a:r>
+                <a:rPr lang="en-US" sz="2400" dirty="0" smtClean="0"/>
+                <a:t>: Data efficiency</a:t>
+              </a:r>
+              <a:endParaRPr lang="en-US" sz="2400" dirty="0"/>
+            </a:p>
+            <a:p>
+              <a:pPr marL="0" indent="0">
+                <a:buFont typeface="Arial" pitchFamily="34" charset="0"/>
+                <a:buNone/>
+              </a:pPr>
+              <a:endParaRPr lang="en-US" sz="2400" dirty="0" smtClean="0"/>
+            </a:p>
+            <a:p>
+              <a:pPr marL="0" indent="0">
+                <a:buFont typeface="Arial" pitchFamily="34" charset="0"/>
+                <a:buNone/>
+              </a:pPr>
+              <a:endParaRPr lang="en-US" sz="2400" dirty="0"/>
+            </a:p>
+          </p:txBody>
+        </p:sp>
+      </p:grpSp>
+      <p:grpSp>
+        <p:nvGrpSpPr>
+          <p:cNvPr id="34" name="Group 33"/>
+          <p:cNvGrpSpPr/>
+          <p:nvPr/>
+        </p:nvGrpSpPr>
+        <p:grpSpPr>
+          <a:xfrm>
+            <a:off x="6127383" y="5073506"/>
+            <a:ext cx="5733486" cy="1365479"/>
+            <a:chOff x="509723" y="6064985"/>
+            <a:chExt cx="5733486" cy="1365479"/>
+          </a:xfrm>
+        </p:grpSpPr>
+        <p:pic>
+          <p:nvPicPr>
+            <p:cNvPr id="24" name="Picture 23"/>
+            <p:cNvPicPr>
+              <a:picLocks noChangeAspect="1"/>
+            </p:cNvPicPr>
+            <p:nvPr/>
+          </p:nvPicPr>
+          <p:blipFill>
+            <a:blip r:embed="rId11"/>
+            <a:stretch>
+              <a:fillRect/>
+            </a:stretch>
+          </p:blipFill>
+          <p:spPr>
+            <a:xfrm>
+              <a:off x="509723" y="6064985"/>
+              <a:ext cx="514350" cy="768350"/>
+            </a:xfrm>
+            <a:prstGeom prst="rect">
+              <a:avLst/>
+            </a:prstGeom>
+          </p:spPr>
+        </p:pic>
+        <p:sp>
+          <p:nvSpPr>
+            <p:cNvPr id="25" name="Content Placeholder 5"/>
+            <p:cNvSpPr txBox="1">
+              <a:spLocks/>
+            </p:cNvSpPr>
+            <p:nvPr/>
+          </p:nvSpPr>
+          <p:spPr>
+            <a:xfrm>
+              <a:off x="1102433" y="6285535"/>
+              <a:ext cx="5140776" cy="1144929"/>
+            </a:xfrm>
+            <a:prstGeom prst="rect">
+              <a:avLst/>
+            </a:prstGeom>
+          </p:spPr>
+          <p:txBody>
+            <a:bodyPr vert="horz" wrap="square" lIns="0" tIns="0" rIns="0" bIns="0" rtlCol="0">
+              <a:spAutoFit/>
+            </a:bodyPr>
+            <a:lstStyle>
+              <a:lvl1pPr marL="341211" indent="-341211" algn="l" defTabSz="914089" rtl="0" eaLnBrk="1" latinLnBrk="0" hangingPunct="1">
+                <a:lnSpc>
+                  <a:spcPct val="90000"/>
+                </a:lnSpc>
+                <a:spcBef>
+                  <a:spcPct val="20000"/>
+                </a:spcBef>
+                <a:buSzPct val="80000"/>
+                <a:buFont typeface="Arial" pitchFamily="34" charset="0"/>
+                <a:buChar char="•"/>
+                <a:defRPr sz="3199" kern="1200">
+                  <a:gradFill>
+                    <a:gsLst>
+                      <a:gs pos="0">
+                        <a:srgbClr val="595959"/>
+                      </a:gs>
+                      <a:gs pos="86000">
+                        <a:srgbClr val="595959"/>
+                      </a:gs>
+                    </a:gsLst>
+                    <a:lin ang="5400000" scaled="0"/>
+                  </a:gradFill>
+                  <a:latin typeface="+mn-lt"/>
+                  <a:ea typeface="+mn-ea"/>
+                  <a:cs typeface="+mn-cs"/>
+                </a:defRPr>
+              </a:lvl1pPr>
+              <a:lvl2pPr marL="626875" indent="-285664" algn="l" defTabSz="914089" rtl="0" eaLnBrk="1" latinLnBrk="0" hangingPunct="1">
+                <a:lnSpc>
+                  <a:spcPct val="90000"/>
+                </a:lnSpc>
+                <a:spcBef>
+                  <a:spcPct val="20000"/>
+                </a:spcBef>
+                <a:buSzPct val="80000"/>
+                <a:buFont typeface="Arial" pitchFamily="34" charset="0"/>
+                <a:buChar char="•"/>
+                <a:defRPr sz="2799" kern="1200">
+                  <a:gradFill>
+                    <a:gsLst>
+                      <a:gs pos="0">
+                        <a:srgbClr val="595959"/>
+                      </a:gs>
+                      <a:gs pos="86000">
+                        <a:srgbClr val="595959"/>
+                      </a:gs>
+                    </a:gsLst>
+                    <a:lin ang="5400000" scaled="0"/>
+                  </a:gradFill>
+                  <a:latin typeface="+mn-lt"/>
+                  <a:ea typeface="+mn-ea"/>
+                  <a:cs typeface="+mn-cs"/>
+                </a:defRPr>
+              </a:lvl2pPr>
+              <a:lvl3pPr marL="914126" indent="-287252" algn="l" defTabSz="914089" rtl="0" eaLnBrk="1" latinLnBrk="0" hangingPunct="1">
+                <a:lnSpc>
+                  <a:spcPct val="90000"/>
+                </a:lnSpc>
+                <a:spcBef>
+                  <a:spcPct val="20000"/>
+                </a:spcBef>
+                <a:buSzPct val="80000"/>
+                <a:buFont typeface="Arial" pitchFamily="34" charset="0"/>
+                <a:buChar char="•"/>
+                <a:defRPr sz="2399" kern="1200">
+                  <a:gradFill>
+                    <a:gsLst>
+                      <a:gs pos="0">
+                        <a:srgbClr val="595959"/>
+                      </a:gs>
+                      <a:gs pos="86000">
+                        <a:srgbClr val="595959"/>
+                      </a:gs>
+                    </a:gsLst>
+                    <a:lin ang="5400000" scaled="0"/>
+                  </a:gradFill>
+                  <a:latin typeface="+mn-lt"/>
+                  <a:ea typeface="+mn-ea"/>
+                  <a:cs typeface="+mn-cs"/>
+                </a:defRPr>
+              </a:lvl3pPr>
+              <a:lvl4pPr marL="1712399" indent="-225357" algn="l" defTabSz="914089" rtl="0" eaLnBrk="1" latinLnBrk="0" hangingPunct="1">
+                <a:lnSpc>
+                  <a:spcPct val="90000"/>
+                </a:lnSpc>
+                <a:spcBef>
+                  <a:spcPct val="20000"/>
+                </a:spcBef>
+                <a:buSzPct val="80000"/>
+                <a:buFont typeface="Arial" pitchFamily="34" charset="0"/>
+                <a:buChar char="•"/>
+                <a:defRPr sz="1999" kern="1200">
+                  <a:gradFill>
+                    <a:gsLst>
+                      <a:gs pos="0">
+                        <a:srgbClr val="595959"/>
+                      </a:gs>
+                      <a:gs pos="86000">
+                        <a:srgbClr val="595959"/>
+                      </a:gs>
+                    </a:gsLst>
+                    <a:lin ang="5400000" scaled="0"/>
+                  </a:gradFill>
+                  <a:latin typeface="+mn-lt"/>
+                  <a:ea typeface="+mn-ea"/>
+                  <a:cs typeface="+mn-cs"/>
+                </a:defRPr>
+              </a:lvl4pPr>
+              <a:lvl5pPr marL="1944105" indent="-231705" algn="l" defTabSz="914089" rtl="0" eaLnBrk="1" latinLnBrk="0" hangingPunct="1">
+                <a:lnSpc>
+                  <a:spcPct val="90000"/>
+                </a:lnSpc>
+                <a:spcBef>
+                  <a:spcPct val="20000"/>
+                </a:spcBef>
+                <a:buSzPct val="80000"/>
+                <a:buFont typeface="Arial" pitchFamily="34" charset="0"/>
+                <a:buChar char="•"/>
+                <a:defRPr sz="1999" kern="1200">
+                  <a:gradFill>
+                    <a:gsLst>
+                      <a:gs pos="0">
+                        <a:srgbClr val="595959"/>
+                      </a:gs>
+                      <a:gs pos="86000">
+                        <a:srgbClr val="595959"/>
+                      </a:gs>
+                    </a:gsLst>
+                    <a:lin ang="5400000" scaled="0"/>
+                  </a:gradFill>
+                  <a:latin typeface="+mn-lt"/>
+                  <a:ea typeface="+mn-ea"/>
+                  <a:cs typeface="+mn-cs"/>
+                </a:defRPr>
+              </a:lvl5pPr>
+              <a:lvl6pPr marL="2513745" indent="-228522" algn="l" defTabSz="914089" rtl="0" eaLnBrk="1" latinLnBrk="0" hangingPunct="1">
+                <a:spcBef>
+                  <a:spcPct val="20000"/>
+                </a:spcBef>
+                <a:buFont typeface="Arial" pitchFamily="34" charset="0"/>
+                <a:buChar char="•"/>
+                <a:defRPr sz="1799" kern="1200">
+                  <a:solidFill>
+                    <a:schemeClr val="tx1"/>
+                  </a:solidFill>
+                  <a:latin typeface="+mn-lt"/>
+                  <a:ea typeface="+mn-ea"/>
+                  <a:cs typeface="+mn-cs"/>
+                </a:defRPr>
+              </a:lvl6pPr>
+              <a:lvl7pPr marL="2970789" indent="-228522" algn="l" defTabSz="914089" rtl="0" eaLnBrk="1" latinLnBrk="0" hangingPunct="1">
+                <a:spcBef>
+                  <a:spcPct val="20000"/>
+                </a:spcBef>
+                <a:buFont typeface="Arial" pitchFamily="34" charset="0"/>
+                <a:buChar char="•"/>
+                <a:defRPr sz="1799" kern="1200">
+                  <a:solidFill>
+                    <a:schemeClr val="tx1"/>
+                  </a:solidFill>
+                  <a:latin typeface="+mn-lt"/>
+                  <a:ea typeface="+mn-ea"/>
+                  <a:cs typeface="+mn-cs"/>
+                </a:defRPr>
+              </a:lvl7pPr>
+              <a:lvl8pPr marL="3427834" indent="-228522" algn="l" defTabSz="914089" rtl="0" eaLnBrk="1" latinLnBrk="0" hangingPunct="1">
+                <a:spcBef>
+                  <a:spcPct val="20000"/>
+                </a:spcBef>
+                <a:buFont typeface="Arial" pitchFamily="34" charset="0"/>
+                <a:buChar char="•"/>
+                <a:defRPr sz="1799" kern="1200">
+                  <a:solidFill>
+                    <a:schemeClr val="tx1"/>
+                  </a:solidFill>
+                  <a:latin typeface="+mn-lt"/>
+                  <a:ea typeface="+mn-ea"/>
+                  <a:cs typeface="+mn-cs"/>
+                </a:defRPr>
+              </a:lvl8pPr>
+              <a:lvl9pPr marL="3884879" indent="-228522" algn="l" defTabSz="914089" rtl="0" eaLnBrk="1" latinLnBrk="0" hangingPunct="1">
+                <a:spcBef>
+                  <a:spcPct val="20000"/>
+                </a:spcBef>
+                <a:buFont typeface="Arial" pitchFamily="34" charset="0"/>
+                <a:buChar char="•"/>
+                <a:defRPr sz="1799" kern="1200">
+                  <a:solidFill>
+                    <a:schemeClr val="tx1"/>
+                  </a:solidFill>
+                  <a:latin typeface="+mn-lt"/>
+                  <a:ea typeface="+mn-ea"/>
+                  <a:cs typeface="+mn-cs"/>
+                </a:defRPr>
+              </a:lvl9pPr>
+            </a:lstStyle>
+            <a:p>
+              <a:pPr marL="0" indent="0">
+                <a:buNone/>
+              </a:pPr>
+              <a:r>
+                <a:rPr lang="en-US" sz="2400" dirty="0" smtClean="0"/>
+                <a:t>Zookeeper: Distributed Coordination</a:t>
+              </a:r>
+              <a:endParaRPr lang="en-US" sz="2400" dirty="0"/>
+            </a:p>
+            <a:p>
+              <a:pPr marL="0" indent="0">
+                <a:buFont typeface="Arial" pitchFamily="34" charset="0"/>
+                <a:buNone/>
+              </a:pPr>
+              <a:endParaRPr lang="en-US" sz="2400" dirty="0" smtClean="0"/>
+            </a:p>
+            <a:p>
+              <a:pPr marL="0" indent="0">
+                <a:buFont typeface="Arial" pitchFamily="34" charset="0"/>
+                <a:buNone/>
+              </a:pPr>
+              <a:endParaRPr lang="en-US" sz="2400" dirty="0"/>
+            </a:p>
+          </p:txBody>
+        </p:sp>
+      </p:grpSp>
+      <p:grpSp>
+        <p:nvGrpSpPr>
+          <p:cNvPr id="37" name="Group 36"/>
+          <p:cNvGrpSpPr/>
+          <p:nvPr/>
+        </p:nvGrpSpPr>
+        <p:grpSpPr>
+          <a:xfrm>
+            <a:off x="519874" y="1437751"/>
+            <a:ext cx="3825625" cy="1229803"/>
+            <a:chOff x="519248" y="1379049"/>
+            <a:chExt cx="3825625" cy="1229803"/>
+          </a:xfrm>
+        </p:grpSpPr>
+        <p:pic>
+          <p:nvPicPr>
+            <p:cNvPr id="5" name="Picture 4"/>
+            <p:cNvPicPr>
+              <a:picLocks noChangeAspect="1"/>
+            </p:cNvPicPr>
+            <p:nvPr/>
+          </p:nvPicPr>
+          <p:blipFill>
+            <a:blip r:embed="rId12"/>
+            <a:stretch>
+              <a:fillRect/>
+            </a:stretch>
+          </p:blipFill>
+          <p:spPr>
+            <a:xfrm>
+              <a:off x="519248" y="1379049"/>
+              <a:ext cx="469900" cy="469900"/>
+            </a:xfrm>
+            <a:prstGeom prst="rect">
+              <a:avLst/>
+            </a:prstGeom>
+          </p:spPr>
+        </p:pic>
+        <p:sp>
+          <p:nvSpPr>
+            <p:cNvPr id="36" name="Content Placeholder 5"/>
+            <p:cNvSpPr txBox="1">
+              <a:spLocks/>
+            </p:cNvSpPr>
+            <p:nvPr/>
+          </p:nvSpPr>
+          <p:spPr>
+            <a:xfrm>
+              <a:off x="1035258" y="1463923"/>
+              <a:ext cx="3309615" cy="1144929"/>
+            </a:xfrm>
+            <a:prstGeom prst="rect">
+              <a:avLst/>
+            </a:prstGeom>
+          </p:spPr>
+          <p:txBody>
+            <a:bodyPr vert="horz" wrap="square" lIns="0" tIns="0" rIns="0" bIns="0" rtlCol="0">
+              <a:spAutoFit/>
+            </a:bodyPr>
+            <a:lstStyle>
+              <a:lvl1pPr marL="341211" indent="-341211" algn="l" defTabSz="914089" rtl="0" eaLnBrk="1" latinLnBrk="0" hangingPunct="1">
+                <a:lnSpc>
+                  <a:spcPct val="90000"/>
+                </a:lnSpc>
+                <a:spcBef>
+                  <a:spcPct val="20000"/>
+                </a:spcBef>
+                <a:buSzPct val="80000"/>
+                <a:buFont typeface="Arial" pitchFamily="34" charset="0"/>
+                <a:buChar char="•"/>
+                <a:defRPr sz="3199" kern="1200">
+                  <a:gradFill>
+                    <a:gsLst>
+                      <a:gs pos="0">
+                        <a:srgbClr val="595959"/>
+                      </a:gs>
+                      <a:gs pos="86000">
+                        <a:srgbClr val="595959"/>
+                      </a:gs>
+                    </a:gsLst>
+                    <a:lin ang="5400000" scaled="0"/>
+                  </a:gradFill>
+                  <a:latin typeface="+mn-lt"/>
+                  <a:ea typeface="+mn-ea"/>
+                  <a:cs typeface="+mn-cs"/>
+                </a:defRPr>
+              </a:lvl1pPr>
+              <a:lvl2pPr marL="626875" indent="-285664" algn="l" defTabSz="914089" rtl="0" eaLnBrk="1" latinLnBrk="0" hangingPunct="1">
+                <a:lnSpc>
+                  <a:spcPct val="90000"/>
+                </a:lnSpc>
+                <a:spcBef>
+                  <a:spcPct val="20000"/>
+                </a:spcBef>
+                <a:buSzPct val="80000"/>
+                <a:buFont typeface="Arial" pitchFamily="34" charset="0"/>
+                <a:buChar char="•"/>
+                <a:defRPr sz="2799" kern="1200">
+                  <a:gradFill>
+                    <a:gsLst>
+                      <a:gs pos="0">
+                        <a:srgbClr val="595959"/>
+                      </a:gs>
+                      <a:gs pos="86000">
+                        <a:srgbClr val="595959"/>
+                      </a:gs>
+                    </a:gsLst>
+                    <a:lin ang="5400000" scaled="0"/>
+                  </a:gradFill>
+                  <a:latin typeface="+mn-lt"/>
+                  <a:ea typeface="+mn-ea"/>
+                  <a:cs typeface="+mn-cs"/>
+                </a:defRPr>
+              </a:lvl2pPr>
+              <a:lvl3pPr marL="914126" indent="-287252" algn="l" defTabSz="914089" rtl="0" eaLnBrk="1" latinLnBrk="0" hangingPunct="1">
+                <a:lnSpc>
+                  <a:spcPct val="90000"/>
+                </a:lnSpc>
+                <a:spcBef>
+                  <a:spcPct val="20000"/>
+                </a:spcBef>
+                <a:buSzPct val="80000"/>
+                <a:buFont typeface="Arial" pitchFamily="34" charset="0"/>
+                <a:buChar char="•"/>
+                <a:defRPr sz="2399" kern="1200">
+                  <a:gradFill>
+                    <a:gsLst>
+                      <a:gs pos="0">
+                        <a:srgbClr val="595959"/>
+                      </a:gs>
+                      <a:gs pos="86000">
+                        <a:srgbClr val="595959"/>
+                      </a:gs>
+                    </a:gsLst>
+                    <a:lin ang="5400000" scaled="0"/>
+                  </a:gradFill>
+                  <a:latin typeface="+mn-lt"/>
+                  <a:ea typeface="+mn-ea"/>
+                  <a:cs typeface="+mn-cs"/>
+                </a:defRPr>
+              </a:lvl3pPr>
+              <a:lvl4pPr marL="1712399" indent="-225357" algn="l" defTabSz="914089" rtl="0" eaLnBrk="1" latinLnBrk="0" hangingPunct="1">
+                <a:lnSpc>
+                  <a:spcPct val="90000"/>
+                </a:lnSpc>
+                <a:spcBef>
+                  <a:spcPct val="20000"/>
+                </a:spcBef>
+                <a:buSzPct val="80000"/>
+                <a:buFont typeface="Arial" pitchFamily="34" charset="0"/>
+                <a:buChar char="•"/>
+                <a:defRPr sz="1999" kern="1200">
+                  <a:gradFill>
+                    <a:gsLst>
+                      <a:gs pos="0">
+                        <a:srgbClr val="595959"/>
+                      </a:gs>
+                      <a:gs pos="86000">
+                        <a:srgbClr val="595959"/>
+                      </a:gs>
+                    </a:gsLst>
+                    <a:lin ang="5400000" scaled="0"/>
+                  </a:gradFill>
+                  <a:latin typeface="+mn-lt"/>
+                  <a:ea typeface="+mn-ea"/>
+                  <a:cs typeface="+mn-cs"/>
+                </a:defRPr>
+              </a:lvl4pPr>
+              <a:lvl5pPr marL="1944105" indent="-231705" algn="l" defTabSz="914089" rtl="0" eaLnBrk="1" latinLnBrk="0" hangingPunct="1">
+                <a:lnSpc>
+                  <a:spcPct val="90000"/>
+                </a:lnSpc>
+                <a:spcBef>
+                  <a:spcPct val="20000"/>
+                </a:spcBef>
+                <a:buSzPct val="80000"/>
+                <a:buFont typeface="Arial" pitchFamily="34" charset="0"/>
+                <a:buChar char="•"/>
+                <a:defRPr sz="1999" kern="1200">
+                  <a:gradFill>
+                    <a:gsLst>
+                      <a:gs pos="0">
+                        <a:srgbClr val="595959"/>
+                      </a:gs>
+                      <a:gs pos="86000">
+                        <a:srgbClr val="595959"/>
+                      </a:gs>
+                    </a:gsLst>
+                    <a:lin ang="5400000" scaled="0"/>
+                  </a:gradFill>
+                  <a:latin typeface="+mn-lt"/>
+                  <a:ea typeface="+mn-ea"/>
+                  <a:cs typeface="+mn-cs"/>
+                </a:defRPr>
+              </a:lvl5pPr>
+              <a:lvl6pPr marL="2513745" indent="-228522" algn="l" defTabSz="914089" rtl="0" eaLnBrk="1" latinLnBrk="0" hangingPunct="1">
+                <a:spcBef>
+                  <a:spcPct val="20000"/>
+                </a:spcBef>
+                <a:buFont typeface="Arial" pitchFamily="34" charset="0"/>
+                <a:buChar char="•"/>
+                <a:defRPr sz="1799" kern="1200">
+                  <a:solidFill>
+                    <a:schemeClr val="tx1"/>
+                  </a:solidFill>
+                  <a:latin typeface="+mn-lt"/>
+                  <a:ea typeface="+mn-ea"/>
+                  <a:cs typeface="+mn-cs"/>
+                </a:defRPr>
+              </a:lvl6pPr>
+              <a:lvl7pPr marL="2970789" indent="-228522" algn="l" defTabSz="914089" rtl="0" eaLnBrk="1" latinLnBrk="0" hangingPunct="1">
+                <a:spcBef>
+                  <a:spcPct val="20000"/>
+                </a:spcBef>
+                <a:buFont typeface="Arial" pitchFamily="34" charset="0"/>
+                <a:buChar char="•"/>
+                <a:defRPr sz="1799" kern="1200">
+                  <a:solidFill>
+                    <a:schemeClr val="tx1"/>
+                  </a:solidFill>
+                  <a:latin typeface="+mn-lt"/>
+                  <a:ea typeface="+mn-ea"/>
+                  <a:cs typeface="+mn-cs"/>
+                </a:defRPr>
+              </a:lvl7pPr>
+              <a:lvl8pPr marL="3427834" indent="-228522" algn="l" defTabSz="914089" rtl="0" eaLnBrk="1" latinLnBrk="0" hangingPunct="1">
+                <a:spcBef>
+                  <a:spcPct val="20000"/>
+                </a:spcBef>
+                <a:buFont typeface="Arial" pitchFamily="34" charset="0"/>
+                <a:buChar char="•"/>
+                <a:defRPr sz="1799" kern="1200">
+                  <a:solidFill>
+                    <a:schemeClr val="tx1"/>
+                  </a:solidFill>
+                  <a:latin typeface="+mn-lt"/>
+                  <a:ea typeface="+mn-ea"/>
+                  <a:cs typeface="+mn-cs"/>
+                </a:defRPr>
+              </a:lvl8pPr>
+              <a:lvl9pPr marL="3884879" indent="-228522" algn="l" defTabSz="914089" rtl="0" eaLnBrk="1" latinLnBrk="0" hangingPunct="1">
+                <a:spcBef>
+                  <a:spcPct val="20000"/>
+                </a:spcBef>
+                <a:buFont typeface="Arial" pitchFamily="34" charset="0"/>
+                <a:buChar char="•"/>
+                <a:defRPr sz="1799" kern="1200">
+                  <a:solidFill>
+                    <a:schemeClr val="tx1"/>
+                  </a:solidFill>
+                  <a:latin typeface="+mn-lt"/>
+                  <a:ea typeface="+mn-ea"/>
+                  <a:cs typeface="+mn-cs"/>
+                </a:defRPr>
+              </a:lvl9pPr>
+            </a:lstStyle>
+            <a:p>
+              <a:pPr marL="0" indent="0">
+                <a:buFont typeface="Arial" pitchFamily="34" charset="0"/>
+                <a:buNone/>
+              </a:pPr>
+              <a:r>
+                <a:rPr lang="en-US" sz="2400" dirty="0" err="1" smtClean="0"/>
+                <a:t>Ambari</a:t>
+              </a:r>
+              <a:r>
+                <a:rPr lang="en-US" sz="2400" dirty="0" smtClean="0"/>
+                <a:t>: Management</a:t>
+              </a:r>
+            </a:p>
+            <a:p>
+              <a:pPr marL="0" indent="0">
+                <a:buFont typeface="Arial" pitchFamily="34" charset="0"/>
+                <a:buNone/>
+              </a:pPr>
+              <a:endParaRPr lang="en-US" sz="2400" dirty="0" smtClean="0"/>
+            </a:p>
+            <a:p>
+              <a:pPr marL="0" indent="0">
+                <a:buFont typeface="Arial" pitchFamily="34" charset="0"/>
+                <a:buNone/>
+              </a:pPr>
+              <a:endParaRPr lang="en-US" sz="2400" dirty="0"/>
+            </a:p>
+          </p:txBody>
+        </p:sp>
+      </p:grpSp>
     </p:spTree>
     <p:extLst>
       <p:ext uri="{BB962C8B-B14F-4D97-AF65-F5344CB8AC3E}">
-        <p14:creationId xmlns:p14="http://schemas.microsoft.com/office/powerpoint/2010/main" val="1433345521"/>
+        <p14:creationId xmlns:p14="http://schemas.microsoft.com/office/powerpoint/2010/main" val="1620710677"/>
       </p:ext>
     </p:extLst>
   </p:cSld>
@@ -14339,7 +17074,11 @@
             </a:r>
             <a:r>
               <a:rPr lang="en-US" dirty="0" smtClean="0"/>
-              <a:t>:\\” in your code</a:t>
+              <a:t>://” </a:t>
+            </a:r>
+            <a:r>
+              <a:rPr lang="en-US" dirty="0" smtClean="0"/>
+              <a:t>in your code</a:t>
             </a:r>
           </a:p>
           <a:p>

</xml_diff>

<commit_message>
Change copyrights on slides
Forgot this earlier when changing lab copyrights.
</commit_message>
<xml_diff>
--- a/Content/BigData/HDInsight and Big Data.pptx
+++ b/Content/BigData/HDInsight and Big Data.pptx
@@ -217,7 +217,7 @@
           <a:p>
             <a:fld id="{2E5CA586-3557-4985-BCD4-35EF5AC8B4A4}" type="datetimeFigureOut">
               <a:rPr lang="en-US" smtClean="0"/>
-              <a:t>10/11/15</a:t>
+              <a:t>1/4/16</a:t>
             </a:fld>
             <a:endParaRPr lang="en-US"/>
           </a:p>
@@ -6841,7 +6841,7 @@
           <a:p>
             <a:pPr defTabSz="913836" eaLnBrk="0" hangingPunct="0"/>
             <a:r>
-              <a:rPr lang="en-US" sz="700" dirty="0">
+              <a:rPr lang="en-US" sz="700">
                 <a:gradFill>
                   <a:gsLst>
                     <a:gs pos="0">
@@ -6858,7 +6858,7 @@
               <a:t>© </a:t>
             </a:r>
             <a:r>
-              <a:rPr lang="en-US" sz="700" dirty="0" smtClean="0">
+              <a:rPr lang="en-US" sz="700" smtClean="0">
                 <a:gradFill>
                   <a:gsLst>
                     <a:gs pos="0">
@@ -6875,7 +6875,7 @@
               <a:t>201</a:t>
             </a:r>
             <a:r>
-              <a:rPr lang="en-US" altLang="zh-CN" sz="700" dirty="0" smtClean="0">
+              <a:rPr lang="en-US" altLang="zh-CN" sz="700" smtClean="0">
                 <a:gradFill>
                   <a:gsLst>
                     <a:gs pos="0">
@@ -6889,10 +6889,10 @@
                 </a:gradFill>
                 <a:cs typeface="Segoe UI" pitchFamily="34" charset="0"/>
               </a:rPr>
-              <a:t>5</a:t>
-            </a:r>
-            <a:r>
-              <a:rPr lang="en-US" sz="700" dirty="0" smtClean="0">
+              <a:t>6</a:t>
+            </a:r>
+            <a:r>
+              <a:rPr lang="en-US" sz="700" smtClean="0">
                 <a:gradFill>
                   <a:gsLst>
                     <a:gs pos="0">
@@ -17224,11 +17224,7 @@
             </a:r>
             <a:r>
               <a:rPr lang="en-US" dirty="0" err="1" smtClean="0"/>
-              <a:t>HOL</a:t>
-            </a:r>
-            <a:r>
-              <a:rPr lang="en-US" dirty="0" err="1" smtClean="0"/>
-              <a:t>.pdf</a:t>
+              <a:t>HOL.pdf</a:t>
             </a:r>
             <a:endParaRPr lang="en-US" dirty="0"/>
           </a:p>

</xml_diff>